<commit_message>
battery of updates relating to updates in densify()
</commit_message>
<xml_diff>
--- a/plots/Fig1 paper overview.pptx
+++ b/plots/Fig1 paper overview.pptx
@@ -197,7 +197,7 @@
           <a:p>
             <a:fld id="{7FBD6D00-5174-A449-9D44-84A3CC40E9AF}" type="datetimeFigureOut">
               <a:rPr lang="en-US" smtClean="0"/>
-              <a:t>1/17/24</a:t>
+              <a:t>2/14/24</a:t>
             </a:fld>
             <a:endParaRPr lang="en-US"/>
           </a:p>
@@ -685,7 +685,7 @@
           <a:p>
             <a:fld id="{A2BAE022-C88F-2B41-9F90-7F832352A141}" type="datetimeFigureOut">
               <a:rPr lang="en-US" smtClean="0"/>
-              <a:t>1/17/24</a:t>
+              <a:t>2/14/24</a:t>
             </a:fld>
             <a:endParaRPr lang="en-US"/>
           </a:p>
@@ -855,7 +855,7 @@
           <a:p>
             <a:fld id="{A2BAE022-C88F-2B41-9F90-7F832352A141}" type="datetimeFigureOut">
               <a:rPr lang="en-US" smtClean="0"/>
-              <a:t>1/17/24</a:t>
+              <a:t>2/14/24</a:t>
             </a:fld>
             <a:endParaRPr lang="en-US"/>
           </a:p>
@@ -1035,7 +1035,7 @@
           <a:p>
             <a:fld id="{A2BAE022-C88F-2B41-9F90-7F832352A141}" type="datetimeFigureOut">
               <a:rPr lang="en-US" smtClean="0"/>
-              <a:t>1/17/24</a:t>
+              <a:t>2/14/24</a:t>
             </a:fld>
             <a:endParaRPr lang="en-US"/>
           </a:p>
@@ -1205,7 +1205,7 @@
           <a:p>
             <a:fld id="{A2BAE022-C88F-2B41-9F90-7F832352A141}" type="datetimeFigureOut">
               <a:rPr lang="en-US" smtClean="0"/>
-              <a:t>1/17/24</a:t>
+              <a:t>2/14/24</a:t>
             </a:fld>
             <a:endParaRPr lang="en-US"/>
           </a:p>
@@ -1449,7 +1449,7 @@
           <a:p>
             <a:fld id="{A2BAE022-C88F-2B41-9F90-7F832352A141}" type="datetimeFigureOut">
               <a:rPr lang="en-US" smtClean="0"/>
-              <a:t>1/17/24</a:t>
+              <a:t>2/14/24</a:t>
             </a:fld>
             <a:endParaRPr lang="en-US"/>
           </a:p>
@@ -1681,7 +1681,7 @@
           <a:p>
             <a:fld id="{A2BAE022-C88F-2B41-9F90-7F832352A141}" type="datetimeFigureOut">
               <a:rPr lang="en-US" smtClean="0"/>
-              <a:t>1/17/24</a:t>
+              <a:t>2/14/24</a:t>
             </a:fld>
             <a:endParaRPr lang="en-US"/>
           </a:p>
@@ -2048,7 +2048,7 @@
           <a:p>
             <a:fld id="{A2BAE022-C88F-2B41-9F90-7F832352A141}" type="datetimeFigureOut">
               <a:rPr lang="en-US" smtClean="0"/>
-              <a:t>1/17/24</a:t>
+              <a:t>2/14/24</a:t>
             </a:fld>
             <a:endParaRPr lang="en-US"/>
           </a:p>
@@ -2166,7 +2166,7 @@
           <a:p>
             <a:fld id="{A2BAE022-C88F-2B41-9F90-7F832352A141}" type="datetimeFigureOut">
               <a:rPr lang="en-US" smtClean="0"/>
-              <a:t>1/17/24</a:t>
+              <a:t>2/14/24</a:t>
             </a:fld>
             <a:endParaRPr lang="en-US"/>
           </a:p>
@@ -2261,7 +2261,7 @@
           <a:p>
             <a:fld id="{A2BAE022-C88F-2B41-9F90-7F832352A141}" type="datetimeFigureOut">
               <a:rPr lang="en-US" smtClean="0"/>
-              <a:t>1/17/24</a:t>
+              <a:t>2/14/24</a:t>
             </a:fld>
             <a:endParaRPr lang="en-US"/>
           </a:p>
@@ -2538,7 +2538,7 @@
           <a:p>
             <a:fld id="{A2BAE022-C88F-2B41-9F90-7F832352A141}" type="datetimeFigureOut">
               <a:rPr lang="en-US" smtClean="0"/>
-              <a:t>1/17/24</a:t>
+              <a:t>2/14/24</a:t>
             </a:fld>
             <a:endParaRPr lang="en-US"/>
           </a:p>
@@ -2795,7 +2795,7 @@
           <a:p>
             <a:fld id="{A2BAE022-C88F-2B41-9F90-7F832352A141}" type="datetimeFigureOut">
               <a:rPr lang="en-US" smtClean="0"/>
-              <a:t>1/17/24</a:t>
+              <a:t>2/14/24</a:t>
             </a:fld>
             <a:endParaRPr lang="en-US"/>
           </a:p>
@@ -3008,7 +3008,7 @@
           <a:p>
             <a:fld id="{A2BAE022-C88F-2B41-9F90-7F832352A141}" type="datetimeFigureOut">
               <a:rPr lang="en-US" smtClean="0"/>
-              <a:t>1/17/24</a:t>
+              <a:t>2/14/24</a:t>
             </a:fld>
             <a:endParaRPr lang="en-US"/>
           </a:p>
@@ -5738,7 +5738,7 @@
                             <a:latin typeface="Helvetica" pitchFamily="2" charset="0"/>
                             <a:cs typeface="Times New Roman" panose="02020603050405020304" pitchFamily="18" charset="0"/>
                           </a:rPr>
-                          <a:t>140 features </a:t>
+                          <a:t>181 features </a:t>
                         </a:r>
                       </a:p>
                       <a:p>
@@ -5751,7 +5751,7 @@
                             <a:latin typeface="Helvetica" pitchFamily="2" charset="0"/>
                             <a:cs typeface="Times New Roman" panose="02020603050405020304" pitchFamily="18" charset="0"/>
                           </a:rPr>
-                          <a:t>1,325 languages</a:t>
+                          <a:t>1,144 languages</a:t>
                         </a:r>
                       </a:p>
                     </p:txBody>
@@ -5824,7 +5824,7 @@
                             <a:latin typeface="Helvetica" pitchFamily="2" charset="0"/>
                             <a:cs typeface="Times New Roman" panose="02020603050405020304" pitchFamily="18" charset="0"/>
                           </a:rPr>
-                          <a:t>149 features </a:t>
+                          <a:t>190 features </a:t>
                         </a:r>
                       </a:p>
                       <a:p>
@@ -5837,7 +5837,7 @@
                             <a:latin typeface="Helvetica" pitchFamily="2" charset="0"/>
                             <a:cs typeface="Times New Roman" panose="02020603050405020304" pitchFamily="18" charset="0"/>
                           </a:rPr>
-                          <a:t>1,455 languages</a:t>
+                          <a:t>1,232 languages</a:t>
                         </a:r>
                       </a:p>
                     </p:txBody>
@@ -6031,7 +6031,7 @@
                           <a:latin typeface="Helvetica" pitchFamily="2" charset="0"/>
                           <a:cs typeface="Times New Roman" panose="02020603050405020304" pitchFamily="18" charset="0"/>
                         </a:rPr>
-                        <a:t>338 features </a:t>
+                        <a:t>344 features </a:t>
                       </a:r>
                     </a:p>
                     <a:p>
@@ -6044,7 +6044,7 @@
                           <a:latin typeface="Helvetica" pitchFamily="2" charset="0"/>
                           <a:cs typeface="Times New Roman" panose="02020603050405020304" pitchFamily="18" charset="0"/>
                         </a:rPr>
-                        <a:t>1,402 languages</a:t>
+                        <a:t>1,677 languages</a:t>
                       </a:r>
                     </a:p>
                   </p:txBody>
@@ -6117,7 +6117,7 @@
                           <a:latin typeface="Helvetica" pitchFamily="2" charset="0"/>
                           <a:cs typeface="Times New Roman" panose="02020603050405020304" pitchFamily="18" charset="0"/>
                         </a:rPr>
-                        <a:t>313 features </a:t>
+                        <a:t>321 features </a:t>
                       </a:r>
                     </a:p>
                     <a:p>
@@ -6130,7 +6130,7 @@
                           <a:latin typeface="Helvetica" pitchFamily="2" charset="0"/>
                           <a:cs typeface="Times New Roman" panose="02020603050405020304" pitchFamily="18" charset="0"/>
                         </a:rPr>
-                        <a:t>538 languages</a:t>
+                        <a:t>643 languages</a:t>
                       </a:r>
                     </a:p>
                   </p:txBody>
@@ -6203,7 +6203,7 @@
                           <a:latin typeface="Helvetica" pitchFamily="2" charset="0"/>
                           <a:cs typeface="Times New Roman" panose="02020603050405020304" pitchFamily="18" charset="0"/>
                         </a:rPr>
-                        <a:t>322 features </a:t>
+                        <a:t>328 features </a:t>
                       </a:r>
                     </a:p>
                     <a:p>
@@ -6216,7 +6216,7 @@
                           <a:latin typeface="Helvetica" pitchFamily="2" charset="0"/>
                           <a:cs typeface="Times New Roman" panose="02020603050405020304" pitchFamily="18" charset="0"/>
                         </a:rPr>
-                        <a:t>1,380 languages</a:t>
+                        <a:t>1,697 languages</a:t>
                       </a:r>
                     </a:p>
                   </p:txBody>
@@ -6289,7 +6289,7 @@
                           <a:latin typeface="Helvetica" pitchFamily="2" charset="0"/>
                           <a:cs typeface="Times New Roman" panose="02020603050405020304" pitchFamily="18" charset="0"/>
                         </a:rPr>
-                        <a:t>329 features </a:t>
+                        <a:t>335 features </a:t>
                       </a:r>
                     </a:p>
                     <a:p>
@@ -6302,7 +6302,7 @@
                           <a:latin typeface="Helvetica" pitchFamily="2" charset="0"/>
                           <a:cs typeface="Times New Roman" panose="02020603050405020304" pitchFamily="18" charset="0"/>
                         </a:rPr>
-                        <a:t>541 languages</a:t>
+                        <a:t>554 languages</a:t>
                       </a:r>
                     </a:p>
                   </p:txBody>
@@ -6799,7 +6799,7 @@
                         <a:latin typeface="Helvetica" pitchFamily="2" charset="0"/>
                         <a:cs typeface="Times New Roman" panose="02020603050405020304" pitchFamily="18" charset="0"/>
                       </a:rPr>
-                      <a:t>269 pops</a:t>
+                      <a:t>235 pops</a:t>
                     </a:r>
                   </a:p>
                 </p:txBody>
@@ -6841,7 +6841,7 @@
                         <a:latin typeface="Helvetica" pitchFamily="2" charset="0"/>
                         <a:cs typeface="Times New Roman" panose="02020603050405020304" pitchFamily="18" charset="0"/>
                       </a:rPr>
-                      <a:t>420 pops</a:t>
+                      <a:t>422 pops</a:t>
                     </a:r>
                   </a:p>
                 </p:txBody>
@@ -7030,7 +7030,7 @@
                         <a:latin typeface="Helvetica" pitchFamily="2" charset="0"/>
                         <a:cs typeface="Times New Roman" panose="02020603050405020304" pitchFamily="18" charset="0"/>
                       </a:rPr>
-                      <a:t>415 pops</a:t>
+                      <a:t>423 pops</a:t>
                     </a:r>
                   </a:p>
                 </p:txBody>
@@ -7072,7 +7072,7 @@
                         <a:latin typeface="Helvetica" pitchFamily="2" charset="0"/>
                         <a:cs typeface="Times New Roman" panose="02020603050405020304" pitchFamily="18" charset="0"/>
                       </a:rPr>
-                      <a:t>260 pops</a:t>
+                      <a:t>246 pops</a:t>
                     </a:r>
                   </a:p>
                 </p:txBody>
@@ -7246,7 +7246,7 @@
                         <a:latin typeface="Helvetica" pitchFamily="2" charset="0"/>
                         <a:cs typeface="Times New Roman" panose="02020603050405020304" pitchFamily="18" charset="0"/>
                       </a:rPr>
-                      <a:t>330 pops</a:t>
+                      <a:t>306 pops</a:t>
                     </a:r>
                   </a:p>
                 </p:txBody>
@@ -7336,7 +7336,7 @@
                         <a:latin typeface="Helvetica" pitchFamily="2" charset="0"/>
                         <a:cs typeface="Times New Roman" panose="02020603050405020304" pitchFamily="18" charset="0"/>
                       </a:rPr>
-                      <a:t>314 pops</a:t>
+                      <a:t>292 pops</a:t>
                     </a:r>
                   </a:p>
                 </p:txBody>

</xml_diff>

<commit_message>
remove gelato, add shortnames
</commit_message>
<xml_diff>
--- a/plots/Fig1 paper overview.pptx
+++ b/plots/Fig1 paper overview.pptx
@@ -197,7 +197,7 @@
           <a:p>
             <a:fld id="{7FBD6D00-5174-A449-9D44-84A3CC40E9AF}" type="datetimeFigureOut">
               <a:rPr lang="en-US" smtClean="0"/>
-              <a:t>2/14/24</a:t>
+              <a:t>2/20/24</a:t>
             </a:fld>
             <a:endParaRPr lang="en-US"/>
           </a:p>
@@ -685,7 +685,7 @@
           <a:p>
             <a:fld id="{A2BAE022-C88F-2B41-9F90-7F832352A141}" type="datetimeFigureOut">
               <a:rPr lang="en-US" smtClean="0"/>
-              <a:t>2/14/24</a:t>
+              <a:t>2/20/24</a:t>
             </a:fld>
             <a:endParaRPr lang="en-US"/>
           </a:p>
@@ -855,7 +855,7 @@
           <a:p>
             <a:fld id="{A2BAE022-C88F-2B41-9F90-7F832352A141}" type="datetimeFigureOut">
               <a:rPr lang="en-US" smtClean="0"/>
-              <a:t>2/14/24</a:t>
+              <a:t>2/20/24</a:t>
             </a:fld>
             <a:endParaRPr lang="en-US"/>
           </a:p>
@@ -1035,7 +1035,7 @@
           <a:p>
             <a:fld id="{A2BAE022-C88F-2B41-9F90-7F832352A141}" type="datetimeFigureOut">
               <a:rPr lang="en-US" smtClean="0"/>
-              <a:t>2/14/24</a:t>
+              <a:t>2/20/24</a:t>
             </a:fld>
             <a:endParaRPr lang="en-US"/>
           </a:p>
@@ -1205,7 +1205,7 @@
           <a:p>
             <a:fld id="{A2BAE022-C88F-2B41-9F90-7F832352A141}" type="datetimeFigureOut">
               <a:rPr lang="en-US" smtClean="0"/>
-              <a:t>2/14/24</a:t>
+              <a:t>2/20/24</a:t>
             </a:fld>
             <a:endParaRPr lang="en-US"/>
           </a:p>
@@ -1449,7 +1449,7 @@
           <a:p>
             <a:fld id="{A2BAE022-C88F-2B41-9F90-7F832352A141}" type="datetimeFigureOut">
               <a:rPr lang="en-US" smtClean="0"/>
-              <a:t>2/14/24</a:t>
+              <a:t>2/20/24</a:t>
             </a:fld>
             <a:endParaRPr lang="en-US"/>
           </a:p>
@@ -1681,7 +1681,7 @@
           <a:p>
             <a:fld id="{A2BAE022-C88F-2B41-9F90-7F832352A141}" type="datetimeFigureOut">
               <a:rPr lang="en-US" smtClean="0"/>
-              <a:t>2/14/24</a:t>
+              <a:t>2/20/24</a:t>
             </a:fld>
             <a:endParaRPr lang="en-US"/>
           </a:p>
@@ -2048,7 +2048,7 @@
           <a:p>
             <a:fld id="{A2BAE022-C88F-2B41-9F90-7F832352A141}" type="datetimeFigureOut">
               <a:rPr lang="en-US" smtClean="0"/>
-              <a:t>2/14/24</a:t>
+              <a:t>2/20/24</a:t>
             </a:fld>
             <a:endParaRPr lang="en-US"/>
           </a:p>
@@ -2166,7 +2166,7 @@
           <a:p>
             <a:fld id="{A2BAE022-C88F-2B41-9F90-7F832352A141}" type="datetimeFigureOut">
               <a:rPr lang="en-US" smtClean="0"/>
-              <a:t>2/14/24</a:t>
+              <a:t>2/20/24</a:t>
             </a:fld>
             <a:endParaRPr lang="en-US"/>
           </a:p>
@@ -2261,7 +2261,7 @@
           <a:p>
             <a:fld id="{A2BAE022-C88F-2B41-9F90-7F832352A141}" type="datetimeFigureOut">
               <a:rPr lang="en-US" smtClean="0"/>
-              <a:t>2/14/24</a:t>
+              <a:t>2/20/24</a:t>
             </a:fld>
             <a:endParaRPr lang="en-US"/>
           </a:p>
@@ -2538,7 +2538,7 @@
           <a:p>
             <a:fld id="{A2BAE022-C88F-2B41-9F90-7F832352A141}" type="datetimeFigureOut">
               <a:rPr lang="en-US" smtClean="0"/>
-              <a:t>2/14/24</a:t>
+              <a:t>2/20/24</a:t>
             </a:fld>
             <a:endParaRPr lang="en-US"/>
           </a:p>
@@ -2795,7 +2795,7 @@
           <a:p>
             <a:fld id="{A2BAE022-C88F-2B41-9F90-7F832352A141}" type="datetimeFigureOut">
               <a:rPr lang="en-US" smtClean="0"/>
-              <a:t>2/14/24</a:t>
+              <a:t>2/20/24</a:t>
             </a:fld>
             <a:endParaRPr lang="en-US"/>
           </a:p>
@@ -3008,7 +3008,7 @@
           <a:p>
             <a:fld id="{A2BAE022-C88F-2B41-9F90-7F832352A141}" type="datetimeFigureOut">
               <a:rPr lang="en-US" smtClean="0"/>
-              <a:t>2/14/24</a:t>
+              <a:t>2/20/24</a:t>
             </a:fld>
             <a:endParaRPr lang="en-US"/>
           </a:p>
@@ -3427,10 +3427,10 @@
         </p:nvGrpSpPr>
         <p:grpSpPr>
           <a:xfrm>
-            <a:off x="513141" y="576357"/>
-            <a:ext cx="10839972" cy="8927909"/>
-            <a:chOff x="513141" y="576357"/>
-            <a:chExt cx="10839972" cy="8927909"/>
+            <a:off x="513141" y="548158"/>
+            <a:ext cx="10839972" cy="8392101"/>
+            <a:chOff x="513141" y="548158"/>
+            <a:chExt cx="10839972" cy="8392101"/>
           </a:xfrm>
         </p:grpSpPr>
         <p:grpSp>
@@ -3447,10 +3447,10 @@
           </p:nvGrpSpPr>
           <p:grpSpPr>
             <a:xfrm>
-              <a:off x="513141" y="576357"/>
-              <a:ext cx="10839972" cy="8927909"/>
-              <a:chOff x="857961" y="1420611"/>
-              <a:chExt cx="10839972" cy="8927909"/>
+              <a:off x="513141" y="548158"/>
+              <a:ext cx="10839972" cy="8392101"/>
+              <a:chOff x="857961" y="1392412"/>
+              <a:chExt cx="10839972" cy="8392101"/>
             </a:xfrm>
           </p:grpSpPr>
           <p:grpSp>
@@ -3467,10 +3467,10 @@
             </p:nvGrpSpPr>
             <p:grpSpPr>
               <a:xfrm>
-                <a:off x="857961" y="1420611"/>
-                <a:ext cx="10839972" cy="8927909"/>
-                <a:chOff x="879225" y="2427048"/>
-                <a:chExt cx="10839972" cy="8927909"/>
+                <a:off x="857961" y="1392412"/>
+                <a:ext cx="10839972" cy="8392101"/>
+                <a:chOff x="879225" y="2398849"/>
+                <a:chExt cx="10839972" cy="8392101"/>
               </a:xfrm>
             </p:grpSpPr>
             <p:grpSp>
@@ -3487,10 +3487,10 @@
               </p:nvGrpSpPr>
               <p:grpSpPr>
                 <a:xfrm>
-                  <a:off x="879225" y="2427048"/>
-                  <a:ext cx="10839972" cy="8927909"/>
-                  <a:chOff x="293589" y="2574532"/>
-                  <a:chExt cx="10839972" cy="8927909"/>
+                  <a:off x="879225" y="2398849"/>
+                  <a:ext cx="10839972" cy="8392101"/>
+                  <a:chOff x="293589" y="2546333"/>
+                  <a:chExt cx="10839972" cy="8392101"/>
                 </a:xfrm>
               </p:grpSpPr>
               <p:grpSp>
@@ -3507,10 +3507,10 @@
                 </p:nvGrpSpPr>
                 <p:grpSpPr>
                   <a:xfrm>
-                    <a:off x="293589" y="2574532"/>
-                    <a:ext cx="10786239" cy="8189416"/>
-                    <a:chOff x="285225" y="2714562"/>
-                    <a:chExt cx="10786239" cy="8189416"/>
+                    <a:off x="293589" y="2546333"/>
+                    <a:ext cx="10786239" cy="8217615"/>
+                    <a:chOff x="285225" y="2686363"/>
+                    <a:chExt cx="10786239" cy="8217615"/>
                   </a:xfrm>
                 </p:grpSpPr>
                 <p:grpSp>
@@ -5664,10 +5664,10 @@
                   </p:nvGrpSpPr>
                   <p:grpSpPr>
                     <a:xfrm>
-                      <a:off x="3080236" y="2714562"/>
-                      <a:ext cx="7991228" cy="830998"/>
-                      <a:chOff x="3080236" y="2714562"/>
-                      <a:chExt cx="7991228" cy="830998"/>
+                      <a:off x="5242160" y="2686363"/>
+                      <a:ext cx="5570291" cy="831001"/>
+                      <a:chOff x="5242160" y="2686363"/>
+                      <a:chExt cx="5570291" cy="831001"/>
                     </a:xfrm>
                   </p:grpSpPr>
                   <p:sp>
@@ -5684,7 +5684,7 @@
                     </p:nvSpPr>
                     <p:spPr>
                       <a:xfrm>
-                        <a:off x="9513425" y="2714562"/>
+                        <a:off x="9254412" y="2686367"/>
                         <a:ext cx="1558039" cy="830997"/>
                       </a:xfrm>
                       <a:prstGeom prst="rect">
@@ -5770,8 +5770,8 @@
                     </p:nvSpPr>
                     <p:spPr>
                       <a:xfrm>
-                        <a:off x="3080236" y="2714563"/>
-                        <a:ext cx="1370857" cy="830997"/>
+                        <a:off x="5242160" y="2686363"/>
+                        <a:ext cx="1558039" cy="830997"/>
                       </a:xfrm>
                       <a:prstGeom prst="rect">
                         <a:avLst/>
@@ -5846,105 +5846,6 @@
               </p:grpSp>
               <p:grpSp>
                 <p:nvGrpSpPr>
-                  <p:cNvPr id="115" name="Group 114">
-                    <a:extLst>
-                      <a:ext uri="{FF2B5EF4-FFF2-40B4-BE49-F238E27FC236}">
-                        <a16:creationId xmlns:a16="http://schemas.microsoft.com/office/drawing/2014/main" id="{F2EEE1F8-E1B9-5E10-B5F0-12BDBFF0A390}"/>
-                      </a:ext>
-                    </a:extLst>
-                  </p:cNvPr>
-                  <p:cNvGrpSpPr/>
-                  <p:nvPr/>
-                </p:nvGrpSpPr>
-                <p:grpSpPr>
-                  <a:xfrm>
-                    <a:off x="6529652" y="2591459"/>
-                    <a:ext cx="930058" cy="996448"/>
-                    <a:chOff x="8864239" y="-29002"/>
-                    <a:chExt cx="930058" cy="996448"/>
-                  </a:xfrm>
-                </p:grpSpPr>
-                <p:sp>
-                  <p:nvSpPr>
-                    <p:cNvPr id="116" name="TextBox 115">
-                      <a:extLst>
-                        <a:ext uri="{FF2B5EF4-FFF2-40B4-BE49-F238E27FC236}">
-                          <a16:creationId xmlns:a16="http://schemas.microsoft.com/office/drawing/2014/main" id="{DB3AFB1F-1597-3BC9-3015-2B17357528C4}"/>
-                        </a:ext>
-                      </a:extLst>
-                    </p:cNvPr>
-                    <p:cNvSpPr txBox="1"/>
-                    <p:nvPr/>
-                  </p:nvSpPr>
-                  <p:spPr>
-                    <a:xfrm>
-                      <a:off x="8864239" y="690447"/>
-                      <a:ext cx="930058" cy="276999"/>
-                    </a:xfrm>
-                    <a:prstGeom prst="rect">
-                      <a:avLst/>
-                    </a:prstGeom>
-                    <a:noFill/>
-                  </p:spPr>
-                  <p:txBody>
-                    <a:bodyPr wrap="square" rtlCol="0">
-                      <a:spAutoFit/>
-                    </a:bodyPr>
-                    <a:lstStyle/>
-                    <a:p>
-                      <a:pPr algn="ctr"/>
-                      <a:r>
-                        <a:rPr lang="en-US" sz="1200" b="1" dirty="0">
-                          <a:solidFill>
-                            <a:srgbClr val="7030A0"/>
-                          </a:solidFill>
-                          <a:latin typeface="Helvetica" pitchFamily="2" charset="0"/>
-                          <a:cs typeface="Times New Roman" panose="02020603050405020304" pitchFamily="18" charset="0"/>
-                        </a:rPr>
-                        <a:t>GELATO</a:t>
-                      </a:r>
-                      <a:endParaRPr lang="en-US" sz="1200" dirty="0">
-                        <a:solidFill>
-                          <a:srgbClr val="7030A0"/>
-                        </a:solidFill>
-                        <a:latin typeface="Helvetica" pitchFamily="2" charset="0"/>
-                        <a:cs typeface="Times New Roman" panose="02020603050405020304" pitchFamily="18" charset="0"/>
-                      </a:endParaRPr>
-                    </a:p>
-                  </p:txBody>
-                </p:sp>
-                <p:pic>
-                  <p:nvPicPr>
-                    <p:cNvPr id="117" name="Picture 116">
-                      <a:extLst>
-                        <a:ext uri="{FF2B5EF4-FFF2-40B4-BE49-F238E27FC236}">
-                          <a16:creationId xmlns:a16="http://schemas.microsoft.com/office/drawing/2014/main" id="{3BD8B4BB-F7F8-5AE5-1D1D-261EB8CE09E1}"/>
-                        </a:ext>
-                      </a:extLst>
-                    </p:cNvPr>
-                    <p:cNvPicPr>
-                      <a:picLocks noChangeAspect="1"/>
-                    </p:cNvPicPr>
-                    <p:nvPr/>
-                  </p:nvPicPr>
-                  <p:blipFill rotWithShape="1">
-                    <a:blip r:embed="rId5"/>
-                    <a:srcRect l="13271" t="10526" r="16206"/>
-                    <a:stretch/>
-                  </p:blipFill>
-                  <p:spPr>
-                    <a:xfrm>
-                      <a:off x="9081734" y="-29002"/>
-                      <a:ext cx="495068" cy="758792"/>
-                    </a:xfrm>
-                    <a:prstGeom prst="rect">
-                      <a:avLst/>
-                    </a:prstGeom>
-                  </p:spPr>
-                </p:pic>
-              </p:grpSp>
-              <p:grpSp>
-                <p:nvGrpSpPr>
                   <p:cNvPr id="122" name="Group 121">
                     <a:extLst>
                       <a:ext uri="{FF2B5EF4-FFF2-40B4-BE49-F238E27FC236}">
@@ -5957,10 +5858,10 @@
                 </p:nvGrpSpPr>
                 <p:grpSpPr>
                   <a:xfrm>
-                    <a:off x="3088601" y="9602922"/>
-                    <a:ext cx="8044960" cy="1786352"/>
-                    <a:chOff x="3088601" y="9602922"/>
-                    <a:chExt cx="8044960" cy="1786352"/>
+                    <a:off x="3328916" y="10107437"/>
+                    <a:ext cx="7804645" cy="830997"/>
+                    <a:chOff x="3328916" y="10107437"/>
+                    <a:chExt cx="7804645" cy="830997"/>
                   </a:xfrm>
                 </p:grpSpPr>
                 <p:sp>
@@ -5977,8 +5878,8 @@
                   </p:nvSpPr>
                   <p:spPr>
                     <a:xfrm>
-                      <a:off x="3088601" y="10107438"/>
-                      <a:ext cx="1622990" cy="830997"/>
+                      <a:off x="3328916" y="10107437"/>
+                      <a:ext cx="1792350" cy="830997"/>
                     </a:xfrm>
                     <a:prstGeom prst="rect">
                       <a:avLst/>
@@ -6235,8 +6136,8 @@
                   </p:nvSpPr>
                   <p:spPr>
                     <a:xfrm>
-                      <a:off x="4711591" y="10107438"/>
-                      <a:ext cx="1588403" cy="830997"/>
+                      <a:off x="5121266" y="10107437"/>
+                      <a:ext cx="1792350" cy="830997"/>
                     </a:xfrm>
                     <a:prstGeom prst="rect">
                       <a:avLst/>
@@ -6307,1040 +6208,7 @@
                     </a:p>
                   </p:txBody>
                 </p:sp>
-                <p:grpSp>
-                  <p:nvGrpSpPr>
-                    <p:cNvPr id="104" name="Group 103">
-                      <a:extLst>
-                        <a:ext uri="{FF2B5EF4-FFF2-40B4-BE49-F238E27FC236}">
-                          <a16:creationId xmlns:a16="http://schemas.microsoft.com/office/drawing/2014/main" id="{962BB3BC-AA15-2146-9B22-4E74A6732E2E}"/>
-                        </a:ext>
-                      </a:extLst>
-                    </p:cNvPr>
-                    <p:cNvGrpSpPr/>
-                    <p:nvPr/>
-                  </p:nvGrpSpPr>
-                  <p:grpSpPr>
-                    <a:xfrm>
-                      <a:off x="6539532" y="10024711"/>
-                      <a:ext cx="930058" cy="996448"/>
-                      <a:chOff x="8903303" y="-155595"/>
-                      <a:chExt cx="930058" cy="996448"/>
-                    </a:xfrm>
-                  </p:grpSpPr>
-                  <p:sp>
-                    <p:nvSpPr>
-                      <p:cNvPr id="53" name="TextBox 52">
-                        <a:extLst>
-                          <a:ext uri="{FF2B5EF4-FFF2-40B4-BE49-F238E27FC236}">
-                            <a16:creationId xmlns:a16="http://schemas.microsoft.com/office/drawing/2014/main" id="{E537A1C4-46CE-4AF8-9CE8-1C0B2EC1E92F}"/>
-                          </a:ext>
-                        </a:extLst>
-                      </p:cNvPr>
-                      <p:cNvSpPr txBox="1"/>
-                      <p:nvPr/>
-                    </p:nvSpPr>
-                    <p:spPr>
-                      <a:xfrm>
-                        <a:off x="8903303" y="563854"/>
-                        <a:ext cx="930058" cy="276999"/>
-                      </a:xfrm>
-                      <a:prstGeom prst="rect">
-                        <a:avLst/>
-                      </a:prstGeom>
-                      <a:noFill/>
-                    </p:spPr>
-                    <p:txBody>
-                      <a:bodyPr wrap="square" rtlCol="0">
-                        <a:spAutoFit/>
-                      </a:bodyPr>
-                      <a:lstStyle/>
-                      <a:p>
-                        <a:pPr algn="ctr"/>
-                        <a:r>
-                          <a:rPr lang="en-US" sz="1200" b="1" dirty="0">
-                            <a:solidFill>
-                              <a:srgbClr val="7030A0"/>
-                            </a:solidFill>
-                            <a:latin typeface="Helvetica" pitchFamily="2" charset="0"/>
-                            <a:cs typeface="Times New Roman" panose="02020603050405020304" pitchFamily="18" charset="0"/>
-                          </a:rPr>
-                          <a:t>GELATO</a:t>
-                        </a:r>
-                        <a:endParaRPr lang="en-US" sz="1200" dirty="0">
-                          <a:solidFill>
-                            <a:srgbClr val="7030A0"/>
-                          </a:solidFill>
-                          <a:latin typeface="Helvetica" pitchFamily="2" charset="0"/>
-                          <a:cs typeface="Times New Roman" panose="02020603050405020304" pitchFamily="18" charset="0"/>
-                        </a:endParaRPr>
-                      </a:p>
-                    </p:txBody>
-                  </p:sp>
-                  <p:pic>
-                    <p:nvPicPr>
-                      <p:cNvPr id="103" name="Picture 102">
-                        <a:extLst>
-                          <a:ext uri="{FF2B5EF4-FFF2-40B4-BE49-F238E27FC236}">
-                            <a16:creationId xmlns:a16="http://schemas.microsoft.com/office/drawing/2014/main" id="{8B992E65-DD04-701A-F644-B6655DA3968A}"/>
-                          </a:ext>
-                        </a:extLst>
-                      </p:cNvPr>
-                      <p:cNvPicPr>
-                        <a:picLocks noChangeAspect="1"/>
-                      </p:cNvPicPr>
-                      <p:nvPr/>
-                    </p:nvPicPr>
-                    <p:blipFill rotWithShape="1">
-                      <a:blip r:embed="rId5"/>
-                      <a:srcRect l="13271" t="10526" r="16206"/>
-                      <a:stretch/>
-                    </p:blipFill>
-                    <p:spPr>
-                      <a:xfrm>
-                        <a:off x="9120798" y="-155595"/>
-                        <a:ext cx="495068" cy="758792"/>
-                      </a:xfrm>
-                      <a:prstGeom prst="rect">
-                        <a:avLst/>
-                      </a:prstGeom>
-                    </p:spPr>
-                  </p:pic>
-                </p:grpSp>
-                <p:sp>
-                  <p:nvSpPr>
-                    <p:cNvPr id="118" name="Arc 117">
-                      <a:extLst>
-                        <a:ext uri="{FF2B5EF4-FFF2-40B4-BE49-F238E27FC236}">
-                          <a16:creationId xmlns:a16="http://schemas.microsoft.com/office/drawing/2014/main" id="{518A2819-0326-1FA5-D8BA-714D04FBCCF3}"/>
-                        </a:ext>
-                      </a:extLst>
-                    </p:cNvPr>
-                    <p:cNvSpPr/>
-                    <p:nvPr/>
-                  </p:nvSpPr>
-                  <p:spPr>
-                    <a:xfrm rot="9491364">
-                      <a:off x="6787904" y="9602922"/>
-                      <a:ext cx="2056334" cy="1786352"/>
-                    </a:xfrm>
-                    <a:prstGeom prst="arc">
-                      <a:avLst>
-                        <a:gd name="adj1" fmla="val 14345825"/>
-                        <a:gd name="adj2" fmla="val 20946889"/>
-                      </a:avLst>
-                    </a:prstGeom>
-                    <a:noFill/>
-                    <a:ln w="6350">
-                      <a:solidFill>
-                        <a:srgbClr val="7030A0"/>
-                      </a:solidFill>
-                      <a:prstDash val="dash"/>
-                      <a:bevel/>
-                      <a:headEnd type="stealth" w="med" len="lg"/>
-                    </a:ln>
-                  </p:spPr>
-                  <p:style>
-                    <a:lnRef idx="1">
-                      <a:schemeClr val="accent1"/>
-                    </a:lnRef>
-                    <a:fillRef idx="0">
-                      <a:schemeClr val="accent1"/>
-                    </a:fillRef>
-                    <a:effectRef idx="0">
-                      <a:schemeClr val="accent1"/>
-                    </a:effectRef>
-                    <a:fontRef idx="minor">
-                      <a:schemeClr val="tx1"/>
-                    </a:fontRef>
-                  </p:style>
-                  <p:txBody>
-                    <a:bodyPr rtlCol="0" anchor="ctr"/>
-                    <a:lstStyle/>
-                    <a:p>
-                      <a:pPr algn="ctr"/>
-                      <a:endParaRPr lang="en-US" dirty="0">
-                        <a:solidFill>
-                          <a:srgbClr val="7030A0"/>
-                        </a:solidFill>
-                        <a:latin typeface="Helvetica" pitchFamily="2" charset="0"/>
-                      </a:endParaRPr>
-                    </a:p>
-                  </p:txBody>
-                </p:sp>
               </p:grpSp>
-              <p:sp>
-                <p:nvSpPr>
-                  <p:cNvPr id="130" name="Arc 129">
-                    <a:extLst>
-                      <a:ext uri="{FF2B5EF4-FFF2-40B4-BE49-F238E27FC236}">
-                        <a16:creationId xmlns:a16="http://schemas.microsoft.com/office/drawing/2014/main" id="{D6BE3E74-C3FA-DE8D-11BF-C9E6A7E74D93}"/>
-                      </a:ext>
-                    </a:extLst>
-                  </p:cNvPr>
-                  <p:cNvSpPr/>
-                  <p:nvPr/>
-                </p:nvSpPr>
-                <p:spPr>
-                  <a:xfrm rot="12108636" flipH="1">
-                    <a:off x="5098599" y="9589739"/>
-                    <a:ext cx="2056334" cy="1786352"/>
-                  </a:xfrm>
-                  <a:prstGeom prst="arc">
-                    <a:avLst>
-                      <a:gd name="adj1" fmla="val 14345825"/>
-                      <a:gd name="adj2" fmla="val 20809460"/>
-                    </a:avLst>
-                  </a:prstGeom>
-                  <a:noFill/>
-                  <a:ln w="6350">
-                    <a:solidFill>
-                      <a:srgbClr val="7030A0"/>
-                    </a:solidFill>
-                    <a:prstDash val="dash"/>
-                    <a:bevel/>
-                    <a:headEnd type="stealth" w="med" len="lg"/>
-                    <a:extLst>
-                      <a:ext uri="{C807C97D-BFC1-408E-A445-0C87EB9F89A2}">
-                        <ask:lineSketchStyleProps xmlns:ask="http://schemas.microsoft.com/office/drawing/2018/sketchyshapes" sd="1219033472">
-                          <a:custGeom>
-                            <a:avLst/>
-                            <a:gdLst>
-                              <a:gd name="connsiteX0" fmla="*/ 553840 w 2056334"/>
-                              <a:gd name="connsiteY0" fmla="*/ 100726 h 1786352"/>
-                              <a:gd name="connsiteX1" fmla="*/ 1392499 w 2056334"/>
-                              <a:gd name="connsiteY1" fmla="*/ 57956 h 1786352"/>
-                              <a:gd name="connsiteX2" fmla="*/ 2027054 w 2056334"/>
-                              <a:gd name="connsiteY2" fmla="*/ 681542 h 1786352"/>
-                              <a:gd name="connsiteX3" fmla="*/ 1028167 w 2056334"/>
-                              <a:gd name="connsiteY3" fmla="*/ 893176 h 1786352"/>
-                              <a:gd name="connsiteX4" fmla="*/ 553840 w 2056334"/>
-                              <a:gd name="connsiteY4" fmla="*/ 100726 h 1786352"/>
-                              <a:gd name="connsiteX0" fmla="*/ 553840 w 2056334"/>
-                              <a:gd name="connsiteY0" fmla="*/ 100726 h 1786352"/>
-                              <a:gd name="connsiteX1" fmla="*/ 1392499 w 2056334"/>
-                              <a:gd name="connsiteY1" fmla="*/ 57956 h 1786352"/>
-                              <a:gd name="connsiteX2" fmla="*/ 2027054 w 2056334"/>
-                              <a:gd name="connsiteY2" fmla="*/ 681542 h 1786352"/>
-                            </a:gdLst>
-                            <a:ahLst/>
-                            <a:cxnLst>
-                              <a:cxn ang="0">
-                                <a:pos x="connsiteX0" y="connsiteY0"/>
-                              </a:cxn>
-                              <a:cxn ang="0">
-                                <a:pos x="connsiteX1" y="connsiteY1"/>
-                              </a:cxn>
-                              <a:cxn ang="0">
-                                <a:pos x="connsiteX2" y="connsiteY2"/>
-                              </a:cxn>
-                            </a:cxnLst>
-                            <a:rect l="l" t="t" r="r" b="b"/>
-                            <a:pathLst>
-                              <a:path w="2056334" h="1786352" stroke="0" extrusionOk="0">
-                                <a:moveTo>
-                                  <a:pt x="553840" y="100726"/>
-                                </a:moveTo>
-                                <a:cubicBezTo>
-                                  <a:pt x="784765" y="-34425"/>
-                                  <a:pt x="1109074" y="-28570"/>
-                                  <a:pt x="1392499" y="57956"/>
-                                </a:cubicBezTo>
-                                <a:cubicBezTo>
-                                  <a:pt x="1762862" y="173530"/>
-                                  <a:pt x="1925587" y="396211"/>
-                                  <a:pt x="2027054" y="681542"/>
-                                </a:cubicBezTo>
-                                <a:cubicBezTo>
-                                  <a:pt x="1754471" y="725766"/>
-                                  <a:pt x="1400750" y="819357"/>
-                                  <a:pt x="1028167" y="893176"/>
-                                </a:cubicBezTo>
-                                <a:cubicBezTo>
-                                  <a:pt x="902625" y="747141"/>
-                                  <a:pt x="810628" y="379527"/>
-                                  <a:pt x="553840" y="100726"/>
-                                </a:cubicBezTo>
-                                <a:close/>
-                              </a:path>
-                              <a:path w="2056334" h="1786352" fill="none" extrusionOk="0">
-                                <a:moveTo>
-                                  <a:pt x="553840" y="100726"/>
-                                </a:moveTo>
-                                <a:cubicBezTo>
-                                  <a:pt x="863362" y="-10721"/>
-                                  <a:pt x="1136584" y="-69006"/>
-                                  <a:pt x="1392499" y="57956"/>
-                                </a:cubicBezTo>
-                                <a:cubicBezTo>
-                                  <a:pt x="1656401" y="154159"/>
-                                  <a:pt x="1940296" y="401623"/>
-                                  <a:pt x="2027054" y="681542"/>
-                                </a:cubicBezTo>
-                              </a:path>
-                            </a:pathLst>
-                          </a:custGeom>
-                          <ask:type>
-                            <ask:lineSketchNone/>
-                          </ask:type>
-                        </ask:lineSketchStyleProps>
-                      </a:ext>
-                    </a:extLst>
-                  </a:ln>
-                </p:spPr>
-                <p:style>
-                  <a:lnRef idx="1">
-                    <a:schemeClr val="accent1"/>
-                  </a:lnRef>
-                  <a:fillRef idx="0">
-                    <a:schemeClr val="accent1"/>
-                  </a:fillRef>
-                  <a:effectRef idx="0">
-                    <a:schemeClr val="accent1"/>
-                  </a:effectRef>
-                  <a:fontRef idx="minor">
-                    <a:schemeClr val="tx1"/>
-                  </a:fontRef>
-                </p:style>
-                <p:txBody>
-                  <a:bodyPr rtlCol="0" anchor="ctr"/>
-                  <a:lstStyle/>
-                  <a:p>
-                    <a:pPr algn="ctr"/>
-                    <a:endParaRPr lang="en-US" dirty="0">
-                      <a:solidFill>
-                        <a:srgbClr val="7030A0"/>
-                      </a:solidFill>
-                      <a:latin typeface="Helvetica" pitchFamily="2" charset="0"/>
-                    </a:endParaRPr>
-                  </a:p>
-                </p:txBody>
-              </p:sp>
-              <p:sp>
-                <p:nvSpPr>
-                  <p:cNvPr id="131" name="Arc 130">
-                    <a:extLst>
-                      <a:ext uri="{FF2B5EF4-FFF2-40B4-BE49-F238E27FC236}">
-                        <a16:creationId xmlns:a16="http://schemas.microsoft.com/office/drawing/2014/main" id="{784BD473-BF7F-C5F3-8B0F-6F2C24FAD357}"/>
-                      </a:ext>
-                    </a:extLst>
-                  </p:cNvPr>
-                  <p:cNvSpPr/>
-                  <p:nvPr/>
-                </p:nvSpPr>
-                <p:spPr>
-                  <a:xfrm rot="12108636" flipH="1">
-                    <a:off x="2859149" y="7909590"/>
-                    <a:ext cx="4635177" cy="3571242"/>
-                  </a:xfrm>
-                  <a:prstGeom prst="arc">
-                    <a:avLst>
-                      <a:gd name="adj1" fmla="val 14987328"/>
-                      <a:gd name="adj2" fmla="val 20033647"/>
-                    </a:avLst>
-                  </a:prstGeom>
-                  <a:noFill/>
-                  <a:ln w="6350">
-                    <a:solidFill>
-                      <a:srgbClr val="7030A0"/>
-                    </a:solidFill>
-                    <a:prstDash val="dash"/>
-                    <a:bevel/>
-                    <a:headEnd type="stealth" w="med" len="lg"/>
-                    <a:extLst>
-                      <a:ext uri="{C807C97D-BFC1-408E-A445-0C87EB9F89A2}">
-                        <ask:lineSketchStyleProps xmlns:ask="http://schemas.microsoft.com/office/drawing/2018/sketchyshapes" sd="981765707">
-                          <a:custGeom>
-                            <a:avLst/>
-                            <a:gdLst>
-                              <a:gd name="connsiteX0" fmla="*/ 673171 w 3627892"/>
-                              <a:gd name="connsiteY0" fmla="*/ 459793 h 4132845"/>
-                              <a:gd name="connsiteX1" fmla="*/ 2551224 w 3627892"/>
-                              <a:gd name="connsiteY1" fmla="*/ 178388 h 4132845"/>
-                              <a:gd name="connsiteX2" fmla="*/ 3597311 w 3627892"/>
-                              <a:gd name="connsiteY2" fmla="*/ 1688583 h 4132845"/>
-                              <a:gd name="connsiteX3" fmla="*/ 1813946 w 3627892"/>
-                              <a:gd name="connsiteY3" fmla="*/ 2066423 h 4132845"/>
-                              <a:gd name="connsiteX4" fmla="*/ 673171 w 3627892"/>
-                              <a:gd name="connsiteY4" fmla="*/ 459793 h 4132845"/>
-                              <a:gd name="connsiteX0" fmla="*/ 673171 w 3627892"/>
-                              <a:gd name="connsiteY0" fmla="*/ 459793 h 4132845"/>
-                              <a:gd name="connsiteX1" fmla="*/ 2551224 w 3627892"/>
-                              <a:gd name="connsiteY1" fmla="*/ 178388 h 4132845"/>
-                              <a:gd name="connsiteX2" fmla="*/ 3597311 w 3627892"/>
-                              <a:gd name="connsiteY2" fmla="*/ 1688583 h 4132845"/>
-                            </a:gdLst>
-                            <a:ahLst/>
-                            <a:cxnLst>
-                              <a:cxn ang="0">
-                                <a:pos x="connsiteX0" y="connsiteY0"/>
-                              </a:cxn>
-                              <a:cxn ang="0">
-                                <a:pos x="connsiteX1" y="connsiteY1"/>
-                              </a:cxn>
-                              <a:cxn ang="0">
-                                <a:pos x="connsiteX2" y="connsiteY2"/>
-                              </a:cxn>
-                            </a:cxnLst>
-                            <a:rect l="l" t="t" r="r" b="b"/>
-                            <a:pathLst>
-                              <a:path w="3627892" h="4132845" stroke="0" extrusionOk="0">
-                                <a:moveTo>
-                                  <a:pt x="673171" y="459793"/>
-                                </a:moveTo>
-                                <a:cubicBezTo>
-                                  <a:pt x="1150749" y="63311"/>
-                                  <a:pt x="1826268" y="-179405"/>
-                                  <a:pt x="2551224" y="178388"/>
-                                </a:cubicBezTo>
-                                <a:cubicBezTo>
-                                  <a:pt x="3111351" y="452781"/>
-                                  <a:pt x="3424815" y="1134984"/>
-                                  <a:pt x="3597311" y="1688583"/>
-                                </a:cubicBezTo>
-                                <a:cubicBezTo>
-                                  <a:pt x="2851187" y="1870507"/>
-                                  <a:pt x="2124857" y="2026451"/>
-                                  <a:pt x="1813946" y="2066423"/>
-                                </a:cubicBezTo>
-                                <a:cubicBezTo>
-                                  <a:pt x="1265827" y="1336705"/>
-                                  <a:pt x="878556" y="865923"/>
-                                  <a:pt x="673171" y="459793"/>
-                                </a:cubicBezTo>
-                                <a:close/>
-                              </a:path>
-                              <a:path w="3627892" h="4132845" fill="none" extrusionOk="0">
-                                <a:moveTo>
-                                  <a:pt x="673171" y="459793"/>
-                                </a:moveTo>
-                                <a:cubicBezTo>
-                                  <a:pt x="1239361" y="-62977"/>
-                                  <a:pt x="1942293" y="-136275"/>
-                                  <a:pt x="2551224" y="178388"/>
-                                </a:cubicBezTo>
-                                <a:cubicBezTo>
-                                  <a:pt x="3142552" y="532965"/>
-                                  <a:pt x="3427617" y="1018403"/>
-                                  <a:pt x="3597311" y="1688583"/>
-                                </a:cubicBezTo>
-                              </a:path>
-                            </a:pathLst>
-                          </a:custGeom>
-                          <ask:type>
-                            <ask:lineSketchNone/>
-                          </ask:type>
-                        </ask:lineSketchStyleProps>
-                      </a:ext>
-                    </a:extLst>
-                  </a:ln>
-                </p:spPr>
-                <p:style>
-                  <a:lnRef idx="1">
-                    <a:schemeClr val="accent1"/>
-                  </a:lnRef>
-                  <a:fillRef idx="0">
-                    <a:schemeClr val="accent1"/>
-                  </a:fillRef>
-                  <a:effectRef idx="0">
-                    <a:schemeClr val="accent1"/>
-                  </a:effectRef>
-                  <a:fontRef idx="minor">
-                    <a:schemeClr val="tx1"/>
-                  </a:fontRef>
-                </p:style>
-                <p:txBody>
-                  <a:bodyPr rtlCol="0" anchor="ctr"/>
-                  <a:lstStyle/>
-                  <a:p>
-                    <a:pPr algn="ctr"/>
-                    <a:endParaRPr lang="en-US">
-                      <a:solidFill>
-                        <a:srgbClr val="7030A0"/>
-                      </a:solidFill>
-                      <a:latin typeface="Helvetica" pitchFamily="2" charset="0"/>
-                    </a:endParaRPr>
-                  </a:p>
-                </p:txBody>
-              </p:sp>
-              <p:sp>
-                <p:nvSpPr>
-                  <p:cNvPr id="138" name="TextBox 137">
-                    <a:extLst>
-                      <a:ext uri="{FF2B5EF4-FFF2-40B4-BE49-F238E27FC236}">
-                        <a16:creationId xmlns:a16="http://schemas.microsoft.com/office/drawing/2014/main" id="{134346D6-128C-91B7-D6F6-61F2EBDDB106}"/>
-                      </a:ext>
-                    </a:extLst>
-                  </p:cNvPr>
-                  <p:cNvSpPr txBox="1"/>
-                  <p:nvPr/>
-                </p:nvSpPr>
-                <p:spPr>
-                  <a:xfrm>
-                    <a:off x="5409019" y="10975903"/>
-                    <a:ext cx="850189" cy="246221"/>
-                  </a:xfrm>
-                  <a:prstGeom prst="rect">
-                    <a:avLst/>
-                  </a:prstGeom>
-                  <a:noFill/>
-                </p:spPr>
-                <p:txBody>
-                  <a:bodyPr wrap="square" rtlCol="0">
-                    <a:spAutoFit/>
-                  </a:bodyPr>
-                  <a:lstStyle/>
-                  <a:p>
-                    <a:pPr algn="ctr"/>
-                    <a:r>
-                      <a:rPr lang="en-US" sz="1000" dirty="0">
-                        <a:solidFill>
-                          <a:srgbClr val="7030A0"/>
-                        </a:solidFill>
-                        <a:latin typeface="Helvetica" pitchFamily="2" charset="0"/>
-                        <a:cs typeface="Times New Roman" panose="02020603050405020304" pitchFamily="18" charset="0"/>
-                      </a:rPr>
-                      <a:t>235 pops</a:t>
-                    </a:r>
-                  </a:p>
-                </p:txBody>
-              </p:sp>
-              <p:sp>
-                <p:nvSpPr>
-                  <p:cNvPr id="139" name="TextBox 138">
-                    <a:extLst>
-                      <a:ext uri="{FF2B5EF4-FFF2-40B4-BE49-F238E27FC236}">
-                        <a16:creationId xmlns:a16="http://schemas.microsoft.com/office/drawing/2014/main" id="{12A235C9-788A-5A51-2B38-ACC99C58DDAB}"/>
-                      </a:ext>
-                    </a:extLst>
-                  </p:cNvPr>
-                  <p:cNvSpPr txBox="1"/>
-                  <p:nvPr/>
-                </p:nvSpPr>
-                <p:spPr>
-                  <a:xfrm>
-                    <a:off x="3201325" y="10950172"/>
-                    <a:ext cx="850189" cy="246221"/>
-                  </a:xfrm>
-                  <a:prstGeom prst="rect">
-                    <a:avLst/>
-                  </a:prstGeom>
-                  <a:noFill/>
-                </p:spPr>
-                <p:txBody>
-                  <a:bodyPr wrap="square" rtlCol="0">
-                    <a:spAutoFit/>
-                  </a:bodyPr>
-                  <a:lstStyle/>
-                  <a:p>
-                    <a:pPr algn="ctr"/>
-                    <a:r>
-                      <a:rPr lang="en-US" sz="1000" dirty="0">
-                        <a:solidFill>
-                          <a:srgbClr val="7030A0"/>
-                        </a:solidFill>
-                        <a:latin typeface="Helvetica" pitchFamily="2" charset="0"/>
-                        <a:cs typeface="Times New Roman" panose="02020603050405020304" pitchFamily="18" charset="0"/>
-                      </a:rPr>
-                      <a:t>422 pops</a:t>
-                    </a:r>
-                  </a:p>
-                </p:txBody>
-              </p:sp>
-              <p:sp>
-                <p:nvSpPr>
-                  <p:cNvPr id="140" name="Arc 139">
-                    <a:extLst>
-                      <a:ext uri="{FF2B5EF4-FFF2-40B4-BE49-F238E27FC236}">
-                        <a16:creationId xmlns:a16="http://schemas.microsoft.com/office/drawing/2014/main" id="{56328CA0-77A1-6E7F-9DE6-EC67EB5B99EA}"/>
-                      </a:ext>
-                    </a:extLst>
-                  </p:cNvPr>
-                  <p:cNvSpPr/>
-                  <p:nvPr/>
-                </p:nvSpPr>
-                <p:spPr>
-                  <a:xfrm rot="9491364">
-                    <a:off x="6457055" y="7931199"/>
-                    <a:ext cx="4635177" cy="3571242"/>
-                  </a:xfrm>
-                  <a:prstGeom prst="arc">
-                    <a:avLst>
-                      <a:gd name="adj1" fmla="val 14987328"/>
-                      <a:gd name="adj2" fmla="val 20044055"/>
-                    </a:avLst>
-                  </a:prstGeom>
-                  <a:noFill/>
-                  <a:ln w="6350">
-                    <a:solidFill>
-                      <a:srgbClr val="7030A0"/>
-                    </a:solidFill>
-                    <a:prstDash val="dash"/>
-                    <a:bevel/>
-                    <a:headEnd type="stealth" w="med" len="lg"/>
-                    <a:extLst>
-                      <a:ext uri="{C807C97D-BFC1-408E-A445-0C87EB9F89A2}">
-                        <ask:lineSketchStyleProps xmlns:ask="http://schemas.microsoft.com/office/drawing/2018/sketchyshapes" sd="981765707">
-                          <a:custGeom>
-                            <a:avLst/>
-                            <a:gdLst>
-                              <a:gd name="connsiteX0" fmla="*/ 673171 w 3627892"/>
-                              <a:gd name="connsiteY0" fmla="*/ 459793 h 4132845"/>
-                              <a:gd name="connsiteX1" fmla="*/ 2551224 w 3627892"/>
-                              <a:gd name="connsiteY1" fmla="*/ 178388 h 4132845"/>
-                              <a:gd name="connsiteX2" fmla="*/ 3597311 w 3627892"/>
-                              <a:gd name="connsiteY2" fmla="*/ 1688583 h 4132845"/>
-                              <a:gd name="connsiteX3" fmla="*/ 1813946 w 3627892"/>
-                              <a:gd name="connsiteY3" fmla="*/ 2066423 h 4132845"/>
-                              <a:gd name="connsiteX4" fmla="*/ 673171 w 3627892"/>
-                              <a:gd name="connsiteY4" fmla="*/ 459793 h 4132845"/>
-                              <a:gd name="connsiteX0" fmla="*/ 673171 w 3627892"/>
-                              <a:gd name="connsiteY0" fmla="*/ 459793 h 4132845"/>
-                              <a:gd name="connsiteX1" fmla="*/ 2551224 w 3627892"/>
-                              <a:gd name="connsiteY1" fmla="*/ 178388 h 4132845"/>
-                              <a:gd name="connsiteX2" fmla="*/ 3597311 w 3627892"/>
-                              <a:gd name="connsiteY2" fmla="*/ 1688583 h 4132845"/>
-                            </a:gdLst>
-                            <a:ahLst/>
-                            <a:cxnLst>
-                              <a:cxn ang="0">
-                                <a:pos x="connsiteX0" y="connsiteY0"/>
-                              </a:cxn>
-                              <a:cxn ang="0">
-                                <a:pos x="connsiteX1" y="connsiteY1"/>
-                              </a:cxn>
-                              <a:cxn ang="0">
-                                <a:pos x="connsiteX2" y="connsiteY2"/>
-                              </a:cxn>
-                            </a:cxnLst>
-                            <a:rect l="l" t="t" r="r" b="b"/>
-                            <a:pathLst>
-                              <a:path w="3627892" h="4132845" stroke="0" extrusionOk="0">
-                                <a:moveTo>
-                                  <a:pt x="673171" y="459793"/>
-                                </a:moveTo>
-                                <a:cubicBezTo>
-                                  <a:pt x="1150749" y="63311"/>
-                                  <a:pt x="1826268" y="-179405"/>
-                                  <a:pt x="2551224" y="178388"/>
-                                </a:cubicBezTo>
-                                <a:cubicBezTo>
-                                  <a:pt x="3111351" y="452781"/>
-                                  <a:pt x="3424815" y="1134984"/>
-                                  <a:pt x="3597311" y="1688583"/>
-                                </a:cubicBezTo>
-                                <a:cubicBezTo>
-                                  <a:pt x="2851187" y="1870507"/>
-                                  <a:pt x="2124857" y="2026451"/>
-                                  <a:pt x="1813946" y="2066423"/>
-                                </a:cubicBezTo>
-                                <a:cubicBezTo>
-                                  <a:pt x="1265827" y="1336705"/>
-                                  <a:pt x="878556" y="865923"/>
-                                  <a:pt x="673171" y="459793"/>
-                                </a:cubicBezTo>
-                                <a:close/>
-                              </a:path>
-                              <a:path w="3627892" h="4132845" fill="none" extrusionOk="0">
-                                <a:moveTo>
-                                  <a:pt x="673171" y="459793"/>
-                                </a:moveTo>
-                                <a:cubicBezTo>
-                                  <a:pt x="1239361" y="-62977"/>
-                                  <a:pt x="1942293" y="-136275"/>
-                                  <a:pt x="2551224" y="178388"/>
-                                </a:cubicBezTo>
-                                <a:cubicBezTo>
-                                  <a:pt x="3142552" y="532965"/>
-                                  <a:pt x="3427617" y="1018403"/>
-                                  <a:pt x="3597311" y="1688583"/>
-                                </a:cubicBezTo>
-                              </a:path>
-                            </a:pathLst>
-                          </a:custGeom>
-                          <ask:type>
-                            <ask:lineSketchNone/>
-                          </ask:type>
-                        </ask:lineSketchStyleProps>
-                      </a:ext>
-                    </a:extLst>
-                  </a:ln>
-                </p:spPr>
-                <p:style>
-                  <a:lnRef idx="1">
-                    <a:schemeClr val="accent1"/>
-                  </a:lnRef>
-                  <a:fillRef idx="0">
-                    <a:schemeClr val="accent1"/>
-                  </a:fillRef>
-                  <a:effectRef idx="0">
-                    <a:schemeClr val="accent1"/>
-                  </a:effectRef>
-                  <a:fontRef idx="minor">
-                    <a:schemeClr val="tx1"/>
-                  </a:fontRef>
-                </p:style>
-                <p:txBody>
-                  <a:bodyPr rtlCol="0" anchor="ctr"/>
-                  <a:lstStyle/>
-                  <a:p>
-                    <a:pPr algn="ctr"/>
-                    <a:endParaRPr lang="en-US">
-                      <a:solidFill>
-                        <a:srgbClr val="7030A0"/>
-                      </a:solidFill>
-                      <a:latin typeface="Helvetica" pitchFamily="2" charset="0"/>
-                    </a:endParaRPr>
-                  </a:p>
-                </p:txBody>
-              </p:sp>
-              <p:sp>
-                <p:nvSpPr>
-                  <p:cNvPr id="141" name="TextBox 140">
-                    <a:extLst>
-                      <a:ext uri="{FF2B5EF4-FFF2-40B4-BE49-F238E27FC236}">
-                        <a16:creationId xmlns:a16="http://schemas.microsoft.com/office/drawing/2014/main" id="{BC9326FF-0098-AFDC-903E-C0E91DEC1157}"/>
-                      </a:ext>
-                    </a:extLst>
-                  </p:cNvPr>
-                  <p:cNvSpPr txBox="1"/>
-                  <p:nvPr/>
-                </p:nvSpPr>
-                <p:spPr>
-                  <a:xfrm>
-                    <a:off x="7624273" y="10975902"/>
-                    <a:ext cx="850189" cy="246221"/>
-                  </a:xfrm>
-                  <a:prstGeom prst="rect">
-                    <a:avLst/>
-                  </a:prstGeom>
-                  <a:noFill/>
-                </p:spPr>
-                <p:txBody>
-                  <a:bodyPr wrap="square" rtlCol="0">
-                    <a:spAutoFit/>
-                  </a:bodyPr>
-                  <a:lstStyle/>
-                  <a:p>
-                    <a:pPr algn="ctr"/>
-                    <a:r>
-                      <a:rPr lang="en-US" sz="1000" dirty="0">
-                        <a:solidFill>
-                          <a:srgbClr val="7030A0"/>
-                        </a:solidFill>
-                        <a:latin typeface="Helvetica" pitchFamily="2" charset="0"/>
-                        <a:cs typeface="Times New Roman" panose="02020603050405020304" pitchFamily="18" charset="0"/>
-                      </a:rPr>
-                      <a:t>423 pops</a:t>
-                    </a:r>
-                  </a:p>
-                </p:txBody>
-              </p:sp>
-              <p:sp>
-                <p:nvSpPr>
-                  <p:cNvPr id="142" name="TextBox 141">
-                    <a:extLst>
-                      <a:ext uri="{FF2B5EF4-FFF2-40B4-BE49-F238E27FC236}">
-                        <a16:creationId xmlns:a16="http://schemas.microsoft.com/office/drawing/2014/main" id="{53CE198D-9B4C-6B52-5247-527C136068D6}"/>
-                      </a:ext>
-                    </a:extLst>
-                  </p:cNvPr>
-                  <p:cNvSpPr txBox="1"/>
-                  <p:nvPr/>
-                </p:nvSpPr>
-                <p:spPr>
-                  <a:xfrm>
-                    <a:off x="9891913" y="10988244"/>
-                    <a:ext cx="850189" cy="246221"/>
-                  </a:xfrm>
-                  <a:prstGeom prst="rect">
-                    <a:avLst/>
-                  </a:prstGeom>
-                  <a:noFill/>
-                </p:spPr>
-                <p:txBody>
-                  <a:bodyPr wrap="square" rtlCol="0">
-                    <a:spAutoFit/>
-                  </a:bodyPr>
-                  <a:lstStyle/>
-                  <a:p>
-                    <a:pPr algn="ctr"/>
-                    <a:r>
-                      <a:rPr lang="en-US" sz="1000" dirty="0">
-                        <a:solidFill>
-                          <a:srgbClr val="7030A0"/>
-                        </a:solidFill>
-                        <a:latin typeface="Helvetica" pitchFamily="2" charset="0"/>
-                        <a:cs typeface="Times New Roman" panose="02020603050405020304" pitchFamily="18" charset="0"/>
-                      </a:rPr>
-                      <a:t>246 pops</a:t>
-                    </a:r>
-                  </a:p>
-                </p:txBody>
-              </p:sp>
-              <p:sp>
-                <p:nvSpPr>
-                  <p:cNvPr id="143" name="TextBox 142">
-                    <a:extLst>
-                      <a:ext uri="{FF2B5EF4-FFF2-40B4-BE49-F238E27FC236}">
-                        <a16:creationId xmlns:a16="http://schemas.microsoft.com/office/drawing/2014/main" id="{B3F8D47F-CFC0-95D0-C7B5-327E1935DF63}"/>
-                      </a:ext>
-                    </a:extLst>
-                  </p:cNvPr>
-                  <p:cNvSpPr txBox="1"/>
-                  <p:nvPr/>
-                </p:nvSpPr>
-                <p:spPr>
-                  <a:xfrm>
-                    <a:off x="6055876" y="3745081"/>
-                    <a:ext cx="850189" cy="246221"/>
-                  </a:xfrm>
-                  <a:prstGeom prst="rect">
-                    <a:avLst/>
-                  </a:prstGeom>
-                  <a:noFill/>
-                </p:spPr>
-                <p:txBody>
-                  <a:bodyPr wrap="square" rtlCol="0">
-                    <a:spAutoFit/>
-                  </a:bodyPr>
-                  <a:lstStyle/>
-                  <a:p>
-                    <a:pPr algn="ctr"/>
-                    <a:r>
-                      <a:rPr lang="en-US" sz="1000" dirty="0">
-                        <a:solidFill>
-                          <a:srgbClr val="7030A0"/>
-                        </a:solidFill>
-                        <a:latin typeface="Helvetica" pitchFamily="2" charset="0"/>
-                        <a:cs typeface="Times New Roman" panose="02020603050405020304" pitchFamily="18" charset="0"/>
-                      </a:rPr>
-                      <a:t>413 pops</a:t>
-                    </a:r>
-                  </a:p>
-                </p:txBody>
-              </p:sp>
-              <p:sp>
-                <p:nvSpPr>
-                  <p:cNvPr id="144" name="TextBox 143">
-                    <a:extLst>
-                      <a:ext uri="{FF2B5EF4-FFF2-40B4-BE49-F238E27FC236}">
-                        <a16:creationId xmlns:a16="http://schemas.microsoft.com/office/drawing/2014/main" id="{1ED8B913-3521-E932-260D-B36E23E01584}"/>
-                      </a:ext>
-                    </a:extLst>
-                  </p:cNvPr>
-                  <p:cNvSpPr txBox="1"/>
-                  <p:nvPr/>
-                </p:nvSpPr>
-                <p:spPr>
-                  <a:xfrm>
-                    <a:off x="8458676" y="3745081"/>
-                    <a:ext cx="850189" cy="246221"/>
-                  </a:xfrm>
-                  <a:prstGeom prst="rect">
-                    <a:avLst/>
-                  </a:prstGeom>
-                  <a:noFill/>
-                </p:spPr>
-                <p:txBody>
-                  <a:bodyPr wrap="square" rtlCol="0">
-                    <a:spAutoFit/>
-                  </a:bodyPr>
-                  <a:lstStyle/>
-                  <a:p>
-                    <a:pPr algn="ctr"/>
-                    <a:r>
-                      <a:rPr lang="en-US" sz="1000" dirty="0">
-                        <a:solidFill>
-                          <a:srgbClr val="7030A0"/>
-                        </a:solidFill>
-                        <a:latin typeface="Helvetica" pitchFamily="2" charset="0"/>
-                        <a:cs typeface="Times New Roman" panose="02020603050405020304" pitchFamily="18" charset="0"/>
-                      </a:rPr>
-                      <a:t>413 pops</a:t>
-                    </a:r>
-                  </a:p>
-                </p:txBody>
-              </p:sp>
-              <p:cxnSp>
-                <p:nvCxnSpPr>
-                  <p:cNvPr id="145" name="Straight Arrow Connector 144">
-                    <a:extLst>
-                      <a:ext uri="{FF2B5EF4-FFF2-40B4-BE49-F238E27FC236}">
-                        <a16:creationId xmlns:a16="http://schemas.microsoft.com/office/drawing/2014/main" id="{9AA0DEA4-24B4-B12C-F18B-1685575BFBE4}"/>
-                      </a:ext>
-                    </a:extLst>
-                  </p:cNvPr>
-                  <p:cNvCxnSpPr>
-                    <a:cxnSpLocks/>
-                  </p:cNvCxnSpPr>
-                  <p:nvPr/>
-                </p:nvCxnSpPr>
-                <p:spPr>
-                  <a:xfrm>
-                    <a:off x="4584618" y="2999450"/>
-                    <a:ext cx="2091571" cy="22767"/>
-                  </a:xfrm>
-                  <a:prstGeom prst="straightConnector1">
-                    <a:avLst/>
-                  </a:prstGeom>
-                  <a:noFill/>
-                  <a:ln w="6350" cap="flat">
-                    <a:solidFill>
-                      <a:srgbClr val="7030A0"/>
-                    </a:solidFill>
-                    <a:prstDash val="dash"/>
-                    <a:bevel/>
-                    <a:headEnd type="stealth" w="med" len="lg"/>
-                    <a:tailEnd type="none" w="lg" len="lg"/>
-                  </a:ln>
-                </p:spPr>
-                <p:style>
-                  <a:lnRef idx="1">
-                    <a:schemeClr val="accent1"/>
-                  </a:lnRef>
-                  <a:fillRef idx="0">
-                    <a:schemeClr val="accent1"/>
-                  </a:fillRef>
-                  <a:effectRef idx="0">
-                    <a:schemeClr val="accent1"/>
-                  </a:effectRef>
-                  <a:fontRef idx="minor">
-                    <a:schemeClr val="tx1"/>
-                  </a:fontRef>
-                </p:style>
-              </p:cxnSp>
-              <p:sp>
-                <p:nvSpPr>
-                  <p:cNvPr id="148" name="TextBox 147">
-                    <a:extLst>
-                      <a:ext uri="{FF2B5EF4-FFF2-40B4-BE49-F238E27FC236}">
-                        <a16:creationId xmlns:a16="http://schemas.microsoft.com/office/drawing/2014/main" id="{D90D40FB-7D6D-9646-FCD9-48D62B7D3C1F}"/>
-                      </a:ext>
-                    </a:extLst>
-                  </p:cNvPr>
-                  <p:cNvSpPr txBox="1"/>
-                  <p:nvPr/>
-                </p:nvSpPr>
-                <p:spPr>
-                  <a:xfrm>
-                    <a:off x="4423901" y="2710375"/>
-                    <a:ext cx="850189" cy="246221"/>
-                  </a:xfrm>
-                  <a:prstGeom prst="rect">
-                    <a:avLst/>
-                  </a:prstGeom>
-                  <a:noFill/>
-                </p:spPr>
-                <p:txBody>
-                  <a:bodyPr wrap="square" rtlCol="0">
-                    <a:spAutoFit/>
-                  </a:bodyPr>
-                  <a:lstStyle/>
-                  <a:p>
-                    <a:pPr algn="ctr"/>
-                    <a:r>
-                      <a:rPr lang="en-US" sz="1000" dirty="0">
-                        <a:solidFill>
-                          <a:srgbClr val="7030A0"/>
-                        </a:solidFill>
-                        <a:latin typeface="Helvetica" pitchFamily="2" charset="0"/>
-                        <a:cs typeface="Times New Roman" panose="02020603050405020304" pitchFamily="18" charset="0"/>
-                      </a:rPr>
-                      <a:t>306 pops</a:t>
-                    </a:r>
-                  </a:p>
-                </p:txBody>
-              </p:sp>
-              <p:cxnSp>
-                <p:nvCxnSpPr>
-                  <p:cNvPr id="149" name="Straight Arrow Connector 148">
-                    <a:extLst>
-                      <a:ext uri="{FF2B5EF4-FFF2-40B4-BE49-F238E27FC236}">
-                        <a16:creationId xmlns:a16="http://schemas.microsoft.com/office/drawing/2014/main" id="{D515DB7A-326A-2B69-DA77-865B8FE5DD63}"/>
-                      </a:ext>
-                    </a:extLst>
-                  </p:cNvPr>
-                  <p:cNvCxnSpPr>
-                    <a:cxnSpLocks/>
-                  </p:cNvCxnSpPr>
-                  <p:nvPr/>
-                </p:nvCxnSpPr>
-                <p:spPr>
-                  <a:xfrm flipH="1" flipV="1">
-                    <a:off x="7289957" y="2999450"/>
-                    <a:ext cx="2051254" cy="22767"/>
-                  </a:xfrm>
-                  <a:prstGeom prst="straightConnector1">
-                    <a:avLst/>
-                  </a:prstGeom>
-                  <a:noFill/>
-                  <a:ln w="6350" cap="flat">
-                    <a:solidFill>
-                      <a:srgbClr val="7030A0"/>
-                    </a:solidFill>
-                    <a:prstDash val="dash"/>
-                    <a:bevel/>
-                    <a:headEnd type="stealth" w="med" len="lg"/>
-                    <a:tailEnd type="none" w="lg" len="lg"/>
-                  </a:ln>
-                </p:spPr>
-                <p:style>
-                  <a:lnRef idx="1">
-                    <a:schemeClr val="accent1"/>
-                  </a:lnRef>
-                  <a:fillRef idx="0">
-                    <a:schemeClr val="accent1"/>
-                  </a:fillRef>
-                  <a:effectRef idx="0">
-                    <a:schemeClr val="accent1"/>
-                  </a:effectRef>
-                  <a:fontRef idx="minor">
-                    <a:schemeClr val="tx1"/>
-                  </a:fontRef>
-                </p:style>
-              </p:cxnSp>
-              <p:sp>
-                <p:nvSpPr>
-                  <p:cNvPr id="158" name="TextBox 157">
-                    <a:extLst>
-                      <a:ext uri="{FF2B5EF4-FFF2-40B4-BE49-F238E27FC236}">
-                        <a16:creationId xmlns:a16="http://schemas.microsoft.com/office/drawing/2014/main" id="{272369CB-50DD-A80A-D66A-D6C0E40EA62D}"/>
-                      </a:ext>
-                    </a:extLst>
-                  </p:cNvPr>
-                  <p:cNvSpPr txBox="1"/>
-                  <p:nvPr/>
-                </p:nvSpPr>
-                <p:spPr>
-                  <a:xfrm>
-                    <a:off x="8677395" y="2732604"/>
-                    <a:ext cx="850189" cy="246221"/>
-                  </a:xfrm>
-                  <a:prstGeom prst="rect">
-                    <a:avLst/>
-                  </a:prstGeom>
-                  <a:noFill/>
-                </p:spPr>
-                <p:txBody>
-                  <a:bodyPr wrap="square" rtlCol="0">
-                    <a:spAutoFit/>
-                  </a:bodyPr>
-                  <a:lstStyle/>
-                  <a:p>
-                    <a:pPr algn="ctr"/>
-                    <a:r>
-                      <a:rPr lang="en-US" sz="1000" dirty="0">
-                        <a:solidFill>
-                          <a:srgbClr val="7030A0"/>
-                        </a:solidFill>
-                        <a:latin typeface="Helvetica" pitchFamily="2" charset="0"/>
-                        <a:cs typeface="Times New Roman" panose="02020603050405020304" pitchFamily="18" charset="0"/>
-                      </a:rPr>
-                      <a:t>292 pops</a:t>
-                    </a:r>
-                  </a:p>
-                </p:txBody>
-              </p:sp>
             </p:grpSp>
             <p:cxnSp>
               <p:nvCxnSpPr>
@@ -7354,13 +6222,14 @@
                 <p:cNvCxnSpPr>
                   <a:cxnSpLocks/>
                   <a:stCxn id="93" idx="2"/>
+                  <a:endCxn id="40" idx="0"/>
                 </p:cNvCxnSpPr>
                 <p:nvPr/>
               </p:nvCxnSpPr>
               <p:spPr>
                 <a:xfrm>
-                  <a:off x="4359665" y="3258046"/>
-                  <a:ext cx="2155657" cy="742098"/>
+                  <a:off x="6615180" y="3229846"/>
+                  <a:ext cx="0" cy="887103"/>
                 </a:xfrm>
                 <a:prstGeom prst="straightConnector1">
                   <a:avLst/>
@@ -7406,7 +6275,7 @@
               </p:nvSpPr>
               <p:spPr>
                 <a:xfrm>
-                  <a:off x="3746543" y="3256814"/>
+                  <a:off x="5802612" y="3259059"/>
                   <a:ext cx="723275" cy="276999"/>
                 </a:xfrm>
                 <a:prstGeom prst="rect">
@@ -7446,13 +6315,15 @@
                 </p:cNvPr>
                 <p:cNvCxnSpPr>
                   <a:cxnSpLocks/>
+                  <a:stCxn id="45" idx="2"/>
+                  <a:endCxn id="3" idx="0"/>
                 </p:cNvCxnSpPr>
                 <p:nvPr/>
               </p:nvCxnSpPr>
               <p:spPr>
-                <a:xfrm flipH="1">
-                  <a:off x="10545793" y="3262563"/>
-                  <a:ext cx="356850" cy="737581"/>
+                <a:xfrm>
+                  <a:off x="10627432" y="3229850"/>
+                  <a:ext cx="0" cy="887103"/>
                 </a:xfrm>
                 <a:prstGeom prst="straightConnector1">
                   <a:avLst/>
@@ -7498,7 +6369,7 @@
               </p:nvSpPr>
               <p:spPr>
                 <a:xfrm>
-                  <a:off x="10876945" y="3258455"/>
+                  <a:off x="10656288" y="3270146"/>
                   <a:ext cx="827283" cy="276999"/>
                 </a:xfrm>
                 <a:prstGeom prst="rect">
@@ -7527,104 +6398,6 @@
                 </a:p>
               </p:txBody>
             </p:sp>
-            <p:cxnSp>
-              <p:nvCxnSpPr>
-                <p:cNvPr id="187" name="Straight Arrow Connector 186">
-                  <a:extLst>
-                    <a:ext uri="{FF2B5EF4-FFF2-40B4-BE49-F238E27FC236}">
-                      <a16:creationId xmlns:a16="http://schemas.microsoft.com/office/drawing/2014/main" id="{F62EBBD4-6A82-70A2-A809-1CC9E7D9FCF4}"/>
-                    </a:ext>
-                  </a:extLst>
-                </p:cNvPr>
-                <p:cNvCxnSpPr>
-                  <a:cxnSpLocks/>
-                  <a:endCxn id="116" idx="2"/>
-                </p:cNvCxnSpPr>
-                <p:nvPr/>
-              </p:nvCxnSpPr>
-              <p:spPr>
-                <a:xfrm flipH="1" flipV="1">
-                  <a:off x="7580317" y="3440423"/>
-                  <a:ext cx="2438492" cy="604297"/>
-                </a:xfrm>
-                <a:prstGeom prst="straightConnector1">
-                  <a:avLst/>
-                </a:prstGeom>
-                <a:noFill/>
-                <a:ln w="6350" cap="flat">
-                  <a:solidFill>
-                    <a:srgbClr val="7030A0"/>
-                  </a:solidFill>
-                  <a:prstDash val="dash"/>
-                  <a:bevel/>
-                  <a:headEnd type="stealth" w="med" len="lg"/>
-                  <a:tailEnd type="none" w="lg" len="lg"/>
-                </a:ln>
-              </p:spPr>
-              <p:style>
-                <a:lnRef idx="1">
-                  <a:schemeClr val="accent1"/>
-                </a:lnRef>
-                <a:fillRef idx="0">
-                  <a:schemeClr val="accent1"/>
-                </a:fillRef>
-                <a:effectRef idx="0">
-                  <a:schemeClr val="accent1"/>
-                </a:effectRef>
-                <a:fontRef idx="minor">
-                  <a:schemeClr val="tx1"/>
-                </a:fontRef>
-              </p:style>
-            </p:cxnSp>
-            <p:cxnSp>
-              <p:nvCxnSpPr>
-                <p:cNvPr id="194" name="Straight Arrow Connector 193">
-                  <a:extLst>
-                    <a:ext uri="{FF2B5EF4-FFF2-40B4-BE49-F238E27FC236}">
-                      <a16:creationId xmlns:a16="http://schemas.microsoft.com/office/drawing/2014/main" id="{59ADB5AE-1171-3047-94AF-FBD938AE69A7}"/>
-                    </a:ext>
-                  </a:extLst>
-                </p:cNvPr>
-                <p:cNvCxnSpPr>
-                  <a:cxnSpLocks/>
-                  <a:endCxn id="116" idx="2"/>
-                </p:cNvCxnSpPr>
-                <p:nvPr/>
-              </p:nvCxnSpPr>
-              <p:spPr>
-                <a:xfrm flipV="1">
-                  <a:off x="7154053" y="3440423"/>
-                  <a:ext cx="426264" cy="610535"/>
-                </a:xfrm>
-                <a:prstGeom prst="straightConnector1">
-                  <a:avLst/>
-                </a:prstGeom>
-                <a:noFill/>
-                <a:ln w="6350" cap="flat">
-                  <a:solidFill>
-                    <a:srgbClr val="7030A0"/>
-                  </a:solidFill>
-                  <a:prstDash val="dash"/>
-                  <a:bevel/>
-                  <a:headEnd type="stealth" w="med" len="lg"/>
-                  <a:tailEnd type="none" w="lg" len="lg"/>
-                </a:ln>
-              </p:spPr>
-              <p:style>
-                <a:lnRef idx="1">
-                  <a:schemeClr val="accent1"/>
-                </a:lnRef>
-                <a:fillRef idx="0">
-                  <a:schemeClr val="accent1"/>
-                </a:fillRef>
-                <a:effectRef idx="0">
-                  <a:schemeClr val="accent1"/>
-                </a:effectRef>
-                <a:fontRef idx="minor">
-                  <a:schemeClr val="tx1"/>
-                </a:fontRef>
-              </p:style>
-            </p:cxnSp>
             <p:cxnSp>
               <p:nvCxnSpPr>
                 <p:cNvPr id="201" name="Straight Arrow Connector 200">
@@ -7972,7 +6745,7 @@
               </p:nvSpPr>
               <p:spPr>
                 <a:xfrm>
-                  <a:off x="6144489" y="9672245"/>
+                  <a:off x="6692501" y="9684701"/>
                   <a:ext cx="723275" cy="276999"/>
                 </a:xfrm>
                 <a:prstGeom prst="rect">
@@ -8017,8 +6790,8 @@
               </p:nvCxnSpPr>
               <p:spPr>
                 <a:xfrm>
-                  <a:off x="4443414" y="9559639"/>
-                  <a:ext cx="2490292" cy="0"/>
+                  <a:off x="4810727" y="9559639"/>
+                  <a:ext cx="2122979" cy="0"/>
                 </a:xfrm>
                 <a:prstGeom prst="straightConnector1">
                   <a:avLst/>
@@ -8061,13 +6834,14 @@
                 </p:cNvPr>
                 <p:cNvCxnSpPr>
                   <a:cxnSpLocks/>
+                  <a:stCxn id="56" idx="0"/>
                 </p:cNvCxnSpPr>
                 <p:nvPr/>
               </p:nvCxnSpPr>
               <p:spPr>
                 <a:xfrm flipV="1">
-                  <a:off x="4444566" y="9556867"/>
-                  <a:ext cx="0" cy="386348"/>
+                  <a:off x="4810727" y="9556523"/>
+                  <a:ext cx="0" cy="403430"/>
                 </a:xfrm>
                 <a:prstGeom prst="straightConnector1">
                   <a:avLst/>
@@ -8116,8 +6890,8 @@
               </p:nvCxnSpPr>
               <p:spPr>
                 <a:xfrm flipV="1">
-                  <a:off x="6091429" y="9555093"/>
-                  <a:ext cx="0" cy="404861"/>
+                  <a:off x="6603077" y="9556867"/>
+                  <a:ext cx="0" cy="403086"/>
                 </a:xfrm>
                 <a:prstGeom prst="straightConnector1">
                   <a:avLst/>
@@ -8163,7 +6937,7 @@
               </p:nvSpPr>
               <p:spPr>
                 <a:xfrm>
-                  <a:off x="4497228" y="9672244"/>
+                  <a:off x="4965951" y="9684700"/>
                   <a:ext cx="723275" cy="276999"/>
                 </a:xfrm>
                 <a:prstGeom prst="rect">
@@ -8208,7 +6982,7 @@
               <p:nvPr/>
             </p:nvPicPr>
             <p:blipFill>
-              <a:blip r:embed="rId6"/>
+              <a:blip r:embed="rId5"/>
               <a:stretch>
                 <a:fillRect/>
               </a:stretch>
@@ -8238,7 +7012,7 @@
               <p:nvPr/>
             </p:nvPicPr>
             <p:blipFill>
-              <a:blip r:embed="rId7"/>
+              <a:blip r:embed="rId6"/>
               <a:stretch>
                 <a:fillRect/>
               </a:stretch>
@@ -8268,7 +7042,7 @@
               <p:nvPr/>
             </p:nvPicPr>
             <p:blipFill>
-              <a:blip r:embed="rId8"/>
+              <a:blip r:embed="rId7"/>
               <a:stretch>
                 <a:fillRect/>
               </a:stretch>
@@ -8299,7 +7073,7 @@
             <p:nvPr/>
           </p:nvPicPr>
           <p:blipFill rotWithShape="1">
-            <a:blip r:embed="rId9">
+            <a:blip r:embed="rId8">
               <a:clrChange>
                 <a:clrFrom>
                   <a:srgbClr val="FFFFFF"/>
@@ -8325,384 +7099,6 @@
           </p:spPr>
         </p:pic>
       </p:grpSp>
-      <p:sp>
-        <p:nvSpPr>
-          <p:cNvPr id="5" name="Arc 4">
-            <a:extLst>
-              <a:ext uri="{FF2B5EF4-FFF2-40B4-BE49-F238E27FC236}">
-                <a16:creationId xmlns:a16="http://schemas.microsoft.com/office/drawing/2014/main" id="{E3060D8B-430C-BFBB-5C6D-D68824C3CAA8}"/>
-              </a:ext>
-            </a:extLst>
-          </p:cNvPr>
-          <p:cNvSpPr/>
-          <p:nvPr/>
-        </p:nvSpPr>
-        <p:spPr>
-          <a:xfrm rot="4263891">
-            <a:off x="2983723" y="4919462"/>
-            <a:ext cx="4625331" cy="4177388"/>
-          </a:xfrm>
-          <a:prstGeom prst="arc">
-            <a:avLst>
-              <a:gd name="adj1" fmla="val 14683780"/>
-              <a:gd name="adj2" fmla="val 18925377"/>
-            </a:avLst>
-          </a:prstGeom>
-          <a:noFill/>
-          <a:ln w="6350">
-            <a:solidFill>
-              <a:srgbClr val="7030A0"/>
-            </a:solidFill>
-            <a:prstDash val="dash"/>
-            <a:bevel/>
-            <a:headEnd type="stealth" w="med" len="lg"/>
-            <a:extLst>
-              <a:ext uri="{C807C97D-BFC1-408E-A445-0C87EB9F89A2}">
-                <ask:lineSketchStyleProps xmlns:ask="http://schemas.microsoft.com/office/drawing/2018/sketchyshapes" sd="981765707">
-                  <a:custGeom>
-                    <a:avLst/>
-                    <a:gdLst>
-                      <a:gd name="connsiteX0" fmla="*/ 673171 w 3627892"/>
-                      <a:gd name="connsiteY0" fmla="*/ 459793 h 4132845"/>
-                      <a:gd name="connsiteX1" fmla="*/ 2551224 w 3627892"/>
-                      <a:gd name="connsiteY1" fmla="*/ 178388 h 4132845"/>
-                      <a:gd name="connsiteX2" fmla="*/ 3597311 w 3627892"/>
-                      <a:gd name="connsiteY2" fmla="*/ 1688583 h 4132845"/>
-                      <a:gd name="connsiteX3" fmla="*/ 1813946 w 3627892"/>
-                      <a:gd name="connsiteY3" fmla="*/ 2066423 h 4132845"/>
-                      <a:gd name="connsiteX4" fmla="*/ 673171 w 3627892"/>
-                      <a:gd name="connsiteY4" fmla="*/ 459793 h 4132845"/>
-                      <a:gd name="connsiteX0" fmla="*/ 673171 w 3627892"/>
-                      <a:gd name="connsiteY0" fmla="*/ 459793 h 4132845"/>
-                      <a:gd name="connsiteX1" fmla="*/ 2551224 w 3627892"/>
-                      <a:gd name="connsiteY1" fmla="*/ 178388 h 4132845"/>
-                      <a:gd name="connsiteX2" fmla="*/ 3597311 w 3627892"/>
-                      <a:gd name="connsiteY2" fmla="*/ 1688583 h 4132845"/>
-                    </a:gdLst>
-                    <a:ahLst/>
-                    <a:cxnLst>
-                      <a:cxn ang="0">
-                        <a:pos x="connsiteX0" y="connsiteY0"/>
-                      </a:cxn>
-                      <a:cxn ang="0">
-                        <a:pos x="connsiteX1" y="connsiteY1"/>
-                      </a:cxn>
-                      <a:cxn ang="0">
-                        <a:pos x="connsiteX2" y="connsiteY2"/>
-                      </a:cxn>
-                    </a:cxnLst>
-                    <a:rect l="l" t="t" r="r" b="b"/>
-                    <a:pathLst>
-                      <a:path w="3627892" h="4132845" stroke="0" extrusionOk="0">
-                        <a:moveTo>
-                          <a:pt x="673171" y="459793"/>
-                        </a:moveTo>
-                        <a:cubicBezTo>
-                          <a:pt x="1150749" y="63311"/>
-                          <a:pt x="1826268" y="-179405"/>
-                          <a:pt x="2551224" y="178388"/>
-                        </a:cubicBezTo>
-                        <a:cubicBezTo>
-                          <a:pt x="3111351" y="452781"/>
-                          <a:pt x="3424815" y="1134984"/>
-                          <a:pt x="3597311" y="1688583"/>
-                        </a:cubicBezTo>
-                        <a:cubicBezTo>
-                          <a:pt x="2851187" y="1870507"/>
-                          <a:pt x="2124857" y="2026451"/>
-                          <a:pt x="1813946" y="2066423"/>
-                        </a:cubicBezTo>
-                        <a:cubicBezTo>
-                          <a:pt x="1265827" y="1336705"/>
-                          <a:pt x="878556" y="865923"/>
-                          <a:pt x="673171" y="459793"/>
-                        </a:cubicBezTo>
-                        <a:close/>
-                      </a:path>
-                      <a:path w="3627892" h="4132845" fill="none" extrusionOk="0">
-                        <a:moveTo>
-                          <a:pt x="673171" y="459793"/>
-                        </a:moveTo>
-                        <a:cubicBezTo>
-                          <a:pt x="1239361" y="-62977"/>
-                          <a:pt x="1942293" y="-136275"/>
-                          <a:pt x="2551224" y="178388"/>
-                        </a:cubicBezTo>
-                        <a:cubicBezTo>
-                          <a:pt x="3142552" y="532965"/>
-                          <a:pt x="3427617" y="1018403"/>
-                          <a:pt x="3597311" y="1688583"/>
-                        </a:cubicBezTo>
-                      </a:path>
-                    </a:pathLst>
-                  </a:custGeom>
-                  <ask:type>
-                    <ask:lineSketchNone/>
-                  </ask:type>
-                </ask:lineSketchStyleProps>
-              </a:ext>
-            </a:extLst>
-          </a:ln>
-        </p:spPr>
-        <p:style>
-          <a:lnRef idx="1">
-            <a:schemeClr val="accent1"/>
-          </a:lnRef>
-          <a:fillRef idx="0">
-            <a:schemeClr val="accent1"/>
-          </a:fillRef>
-          <a:effectRef idx="0">
-            <a:schemeClr val="accent1"/>
-          </a:effectRef>
-          <a:fontRef idx="minor">
-            <a:schemeClr val="tx1"/>
-          </a:fontRef>
-        </p:style>
-        <p:txBody>
-          <a:bodyPr rtlCol="0" anchor="ctr"/>
-          <a:lstStyle/>
-          <a:p>
-            <a:pPr algn="ctr"/>
-            <a:endParaRPr lang="en-US">
-              <a:solidFill>
-                <a:srgbClr val="7030A0"/>
-              </a:solidFill>
-              <a:latin typeface="Helvetica" pitchFamily="2" charset="0"/>
-            </a:endParaRPr>
-          </a:p>
-        </p:txBody>
-      </p:sp>
-      <p:sp>
-        <p:nvSpPr>
-          <p:cNvPr id="6" name="TextBox 5">
-            <a:extLst>
-              <a:ext uri="{FF2B5EF4-FFF2-40B4-BE49-F238E27FC236}">
-                <a16:creationId xmlns:a16="http://schemas.microsoft.com/office/drawing/2014/main" id="{C979A84C-0817-F66C-9265-3294EB9BC532}"/>
-              </a:ext>
-            </a:extLst>
-          </p:cNvPr>
-          <p:cNvSpPr txBox="1"/>
-          <p:nvPr/>
-        </p:nvSpPr>
-        <p:spPr>
-          <a:xfrm>
-            <a:off x="6604520" y="6656525"/>
-            <a:ext cx="850189" cy="246221"/>
-          </a:xfrm>
-          <a:prstGeom prst="rect">
-            <a:avLst/>
-          </a:prstGeom>
-          <a:noFill/>
-        </p:spPr>
-        <p:txBody>
-          <a:bodyPr wrap="square" rtlCol="0">
-            <a:spAutoFit/>
-          </a:bodyPr>
-          <a:lstStyle/>
-          <a:p>
-            <a:pPr algn="ctr"/>
-            <a:r>
-              <a:rPr lang="en-US" sz="1000" dirty="0">
-                <a:solidFill>
-                  <a:srgbClr val="7030A0"/>
-                </a:solidFill>
-                <a:latin typeface="Helvetica" pitchFamily="2" charset="0"/>
-                <a:cs typeface="Times New Roman" panose="02020603050405020304" pitchFamily="18" charset="0"/>
-              </a:rPr>
-              <a:t>565 pops</a:t>
-            </a:r>
-          </a:p>
-        </p:txBody>
-      </p:sp>
-      <p:sp>
-        <p:nvSpPr>
-          <p:cNvPr id="14" name="Arc 13">
-            <a:extLst>
-              <a:ext uri="{FF2B5EF4-FFF2-40B4-BE49-F238E27FC236}">
-                <a16:creationId xmlns:a16="http://schemas.microsoft.com/office/drawing/2014/main" id="{0B049730-5579-C34A-F9AE-60BD7E15B2CA}"/>
-              </a:ext>
-            </a:extLst>
-          </p:cNvPr>
-          <p:cNvSpPr/>
-          <p:nvPr/>
-        </p:nvSpPr>
-        <p:spPr>
-          <a:xfrm rot="18384609" flipH="1">
-            <a:off x="6449382" y="5908920"/>
-            <a:ext cx="6511332" cy="4538163"/>
-          </a:xfrm>
-          <a:prstGeom prst="arc">
-            <a:avLst>
-              <a:gd name="adj1" fmla="val 13426780"/>
-              <a:gd name="adj2" fmla="val 18066759"/>
-            </a:avLst>
-          </a:prstGeom>
-          <a:noFill/>
-          <a:ln w="6350">
-            <a:solidFill>
-              <a:srgbClr val="7030A0"/>
-            </a:solidFill>
-            <a:prstDash val="dash"/>
-            <a:bevel/>
-            <a:headEnd type="stealth" w="med" len="lg"/>
-            <a:extLst>
-              <a:ext uri="{C807C97D-BFC1-408E-A445-0C87EB9F89A2}">
-                <ask:lineSketchStyleProps xmlns:ask="http://schemas.microsoft.com/office/drawing/2018/sketchyshapes" sd="981765707">
-                  <a:custGeom>
-                    <a:avLst/>
-                    <a:gdLst>
-                      <a:gd name="connsiteX0" fmla="*/ 673171 w 3627892"/>
-                      <a:gd name="connsiteY0" fmla="*/ 459793 h 4132845"/>
-                      <a:gd name="connsiteX1" fmla="*/ 2551224 w 3627892"/>
-                      <a:gd name="connsiteY1" fmla="*/ 178388 h 4132845"/>
-                      <a:gd name="connsiteX2" fmla="*/ 3597311 w 3627892"/>
-                      <a:gd name="connsiteY2" fmla="*/ 1688583 h 4132845"/>
-                      <a:gd name="connsiteX3" fmla="*/ 1813946 w 3627892"/>
-                      <a:gd name="connsiteY3" fmla="*/ 2066423 h 4132845"/>
-                      <a:gd name="connsiteX4" fmla="*/ 673171 w 3627892"/>
-                      <a:gd name="connsiteY4" fmla="*/ 459793 h 4132845"/>
-                      <a:gd name="connsiteX0" fmla="*/ 673171 w 3627892"/>
-                      <a:gd name="connsiteY0" fmla="*/ 459793 h 4132845"/>
-                      <a:gd name="connsiteX1" fmla="*/ 2551224 w 3627892"/>
-                      <a:gd name="connsiteY1" fmla="*/ 178388 h 4132845"/>
-                      <a:gd name="connsiteX2" fmla="*/ 3597311 w 3627892"/>
-                      <a:gd name="connsiteY2" fmla="*/ 1688583 h 4132845"/>
-                    </a:gdLst>
-                    <a:ahLst/>
-                    <a:cxnLst>
-                      <a:cxn ang="0">
-                        <a:pos x="connsiteX0" y="connsiteY0"/>
-                      </a:cxn>
-                      <a:cxn ang="0">
-                        <a:pos x="connsiteX1" y="connsiteY1"/>
-                      </a:cxn>
-                      <a:cxn ang="0">
-                        <a:pos x="connsiteX2" y="connsiteY2"/>
-                      </a:cxn>
-                    </a:cxnLst>
-                    <a:rect l="l" t="t" r="r" b="b"/>
-                    <a:pathLst>
-                      <a:path w="3627892" h="4132845" stroke="0" extrusionOk="0">
-                        <a:moveTo>
-                          <a:pt x="673171" y="459793"/>
-                        </a:moveTo>
-                        <a:cubicBezTo>
-                          <a:pt x="1150749" y="63311"/>
-                          <a:pt x="1826268" y="-179405"/>
-                          <a:pt x="2551224" y="178388"/>
-                        </a:cubicBezTo>
-                        <a:cubicBezTo>
-                          <a:pt x="3111351" y="452781"/>
-                          <a:pt x="3424815" y="1134984"/>
-                          <a:pt x="3597311" y="1688583"/>
-                        </a:cubicBezTo>
-                        <a:cubicBezTo>
-                          <a:pt x="2851187" y="1870507"/>
-                          <a:pt x="2124857" y="2026451"/>
-                          <a:pt x="1813946" y="2066423"/>
-                        </a:cubicBezTo>
-                        <a:cubicBezTo>
-                          <a:pt x="1265827" y="1336705"/>
-                          <a:pt x="878556" y="865923"/>
-                          <a:pt x="673171" y="459793"/>
-                        </a:cubicBezTo>
-                        <a:close/>
-                      </a:path>
-                      <a:path w="3627892" h="4132845" fill="none" extrusionOk="0">
-                        <a:moveTo>
-                          <a:pt x="673171" y="459793"/>
-                        </a:moveTo>
-                        <a:cubicBezTo>
-                          <a:pt x="1239361" y="-62977"/>
-                          <a:pt x="1942293" y="-136275"/>
-                          <a:pt x="2551224" y="178388"/>
-                        </a:cubicBezTo>
-                        <a:cubicBezTo>
-                          <a:pt x="3142552" y="532965"/>
-                          <a:pt x="3427617" y="1018403"/>
-                          <a:pt x="3597311" y="1688583"/>
-                        </a:cubicBezTo>
-                      </a:path>
-                    </a:pathLst>
-                  </a:custGeom>
-                  <ask:type>
-                    <ask:lineSketchNone/>
-                  </ask:type>
-                </ask:lineSketchStyleProps>
-              </a:ext>
-            </a:extLst>
-          </a:ln>
-        </p:spPr>
-        <p:style>
-          <a:lnRef idx="1">
-            <a:schemeClr val="accent1"/>
-          </a:lnRef>
-          <a:fillRef idx="0">
-            <a:schemeClr val="accent1"/>
-          </a:fillRef>
-          <a:effectRef idx="0">
-            <a:schemeClr val="accent1"/>
-          </a:effectRef>
-          <a:fontRef idx="minor">
-            <a:schemeClr val="tx1"/>
-          </a:fontRef>
-        </p:style>
-        <p:txBody>
-          <a:bodyPr rtlCol="0" anchor="ctr"/>
-          <a:lstStyle/>
-          <a:p>
-            <a:pPr algn="ctr"/>
-            <a:endParaRPr lang="en-US">
-              <a:solidFill>
-                <a:srgbClr val="7030A0"/>
-              </a:solidFill>
-              <a:latin typeface="Helvetica" pitchFamily="2" charset="0"/>
-            </a:endParaRPr>
-          </a:p>
-        </p:txBody>
-      </p:sp>
-      <p:sp>
-        <p:nvSpPr>
-          <p:cNvPr id="16" name="TextBox 15">
-            <a:extLst>
-              <a:ext uri="{FF2B5EF4-FFF2-40B4-BE49-F238E27FC236}">
-                <a16:creationId xmlns:a16="http://schemas.microsoft.com/office/drawing/2014/main" id="{65A6820D-EB1C-4843-9646-0A801F8E92A0}"/>
-              </a:ext>
-            </a:extLst>
-          </p:cNvPr>
-          <p:cNvSpPr txBox="1"/>
-          <p:nvPr/>
-        </p:nvSpPr>
-        <p:spPr>
-          <a:xfrm>
-            <a:off x="7599155" y="6096800"/>
-            <a:ext cx="850189" cy="246221"/>
-          </a:xfrm>
-          <a:prstGeom prst="rect">
-            <a:avLst/>
-          </a:prstGeom>
-          <a:noFill/>
-        </p:spPr>
-        <p:txBody>
-          <a:bodyPr wrap="square" rtlCol="0">
-            <a:spAutoFit/>
-          </a:bodyPr>
-          <a:lstStyle/>
-          <a:p>
-            <a:pPr algn="ctr"/>
-            <a:r>
-              <a:rPr lang="en-US" sz="1000" dirty="0">
-                <a:solidFill>
-                  <a:srgbClr val="7030A0"/>
-                </a:solidFill>
-                <a:latin typeface="Helvetica" pitchFamily="2" charset="0"/>
-                <a:cs typeface="Times New Roman" panose="02020603050405020304" pitchFamily="18" charset="0"/>
-              </a:rPr>
-              <a:t>565 pops</a:t>
-            </a:r>
-          </a:p>
-        </p:txBody>
-      </p:sp>
     </p:spTree>
     <p:extLst>
       <p:ext uri="{BB962C8B-B14F-4D97-AF65-F5344CB8AC3E}">

</xml_diff>

<commit_message>
comprehensive updates relating to glottolog update (v. 4.8 --> v. 5.0)
this glottolog update mandates changes in essentially everything
</commit_message>
<xml_diff>
--- a/plots/Fig1 paper overview.pptx
+++ b/plots/Fig1 paper overview.pptx
@@ -197,7 +197,7 @@
           <a:p>
             <a:fld id="{7FBD6D00-5174-A449-9D44-84A3CC40E9AF}" type="datetimeFigureOut">
               <a:rPr lang="en-US" smtClean="0"/>
-              <a:t>2/20/24</a:t>
+              <a:t>3/14/24</a:t>
             </a:fld>
             <a:endParaRPr lang="en-US"/>
           </a:p>
@@ -685,7 +685,7 @@
           <a:p>
             <a:fld id="{A2BAE022-C88F-2B41-9F90-7F832352A141}" type="datetimeFigureOut">
               <a:rPr lang="en-US" smtClean="0"/>
-              <a:t>2/20/24</a:t>
+              <a:t>3/14/24</a:t>
             </a:fld>
             <a:endParaRPr lang="en-US"/>
           </a:p>
@@ -855,7 +855,7 @@
           <a:p>
             <a:fld id="{A2BAE022-C88F-2B41-9F90-7F832352A141}" type="datetimeFigureOut">
               <a:rPr lang="en-US" smtClean="0"/>
-              <a:t>2/20/24</a:t>
+              <a:t>3/14/24</a:t>
             </a:fld>
             <a:endParaRPr lang="en-US"/>
           </a:p>
@@ -1035,7 +1035,7 @@
           <a:p>
             <a:fld id="{A2BAE022-C88F-2B41-9F90-7F832352A141}" type="datetimeFigureOut">
               <a:rPr lang="en-US" smtClean="0"/>
-              <a:t>2/20/24</a:t>
+              <a:t>3/14/24</a:t>
             </a:fld>
             <a:endParaRPr lang="en-US"/>
           </a:p>
@@ -1205,7 +1205,7 @@
           <a:p>
             <a:fld id="{A2BAE022-C88F-2B41-9F90-7F832352A141}" type="datetimeFigureOut">
               <a:rPr lang="en-US" smtClean="0"/>
-              <a:t>2/20/24</a:t>
+              <a:t>3/14/24</a:t>
             </a:fld>
             <a:endParaRPr lang="en-US"/>
           </a:p>
@@ -1449,7 +1449,7 @@
           <a:p>
             <a:fld id="{A2BAE022-C88F-2B41-9F90-7F832352A141}" type="datetimeFigureOut">
               <a:rPr lang="en-US" smtClean="0"/>
-              <a:t>2/20/24</a:t>
+              <a:t>3/14/24</a:t>
             </a:fld>
             <a:endParaRPr lang="en-US"/>
           </a:p>
@@ -1681,7 +1681,7 @@
           <a:p>
             <a:fld id="{A2BAE022-C88F-2B41-9F90-7F832352A141}" type="datetimeFigureOut">
               <a:rPr lang="en-US" smtClean="0"/>
-              <a:t>2/20/24</a:t>
+              <a:t>3/14/24</a:t>
             </a:fld>
             <a:endParaRPr lang="en-US"/>
           </a:p>
@@ -2048,7 +2048,7 @@
           <a:p>
             <a:fld id="{A2BAE022-C88F-2B41-9F90-7F832352A141}" type="datetimeFigureOut">
               <a:rPr lang="en-US" smtClean="0"/>
-              <a:t>2/20/24</a:t>
+              <a:t>3/14/24</a:t>
             </a:fld>
             <a:endParaRPr lang="en-US"/>
           </a:p>
@@ -2166,7 +2166,7 @@
           <a:p>
             <a:fld id="{A2BAE022-C88F-2B41-9F90-7F832352A141}" type="datetimeFigureOut">
               <a:rPr lang="en-US" smtClean="0"/>
-              <a:t>2/20/24</a:t>
+              <a:t>3/14/24</a:t>
             </a:fld>
             <a:endParaRPr lang="en-US"/>
           </a:p>
@@ -2261,7 +2261,7 @@
           <a:p>
             <a:fld id="{A2BAE022-C88F-2B41-9F90-7F832352A141}" type="datetimeFigureOut">
               <a:rPr lang="en-US" smtClean="0"/>
-              <a:t>2/20/24</a:t>
+              <a:t>3/14/24</a:t>
             </a:fld>
             <a:endParaRPr lang="en-US"/>
           </a:p>
@@ -2538,7 +2538,7 @@
           <a:p>
             <a:fld id="{A2BAE022-C88F-2B41-9F90-7F832352A141}" type="datetimeFigureOut">
               <a:rPr lang="en-US" smtClean="0"/>
-              <a:t>2/20/24</a:t>
+              <a:t>3/14/24</a:t>
             </a:fld>
             <a:endParaRPr lang="en-US"/>
           </a:p>
@@ -2795,7 +2795,7 @@
           <a:p>
             <a:fld id="{A2BAE022-C88F-2B41-9F90-7F832352A141}" type="datetimeFigureOut">
               <a:rPr lang="en-US" smtClean="0"/>
-              <a:t>2/20/24</a:t>
+              <a:t>3/14/24</a:t>
             </a:fld>
             <a:endParaRPr lang="en-US"/>
           </a:p>
@@ -3008,7 +3008,7 @@
           <a:p>
             <a:fld id="{A2BAE022-C88F-2B41-9F90-7F832352A141}" type="datetimeFigureOut">
               <a:rPr lang="en-US" smtClean="0"/>
-              <a:t>2/20/24</a:t>
+              <a:t>3/14/24</a:t>
             </a:fld>
             <a:endParaRPr lang="en-US"/>
           </a:p>
@@ -3776,7 +3776,7 @@
                                     <a:latin typeface="Helvetica" pitchFamily="2" charset="0"/>
                                     <a:cs typeface="Times New Roman" panose="02020603050405020304" pitchFamily="18" charset="0"/>
                                   </a:rPr>
-                                  <a:t>4,264 languages</a:t>
+                                  <a:t>4,259 languages</a:t>
                                 </a:r>
                               </a:p>
                             </p:txBody>
@@ -4024,7 +4024,7 @@
                                     <a:latin typeface="Helvetica" pitchFamily="2" charset="0"/>
                                     <a:cs typeface="Times New Roman" panose="02020603050405020304" pitchFamily="18" charset="0"/>
                                   </a:rPr>
-                                  <a:t>4,262 languages</a:t>
+                                  <a:t>4,257 languages</a:t>
                                 </a:r>
                               </a:p>
                             </p:txBody>
@@ -5837,7 +5837,7 @@
                             <a:latin typeface="Helvetica" pitchFamily="2" charset="0"/>
                             <a:cs typeface="Times New Roman" panose="02020603050405020304" pitchFamily="18" charset="0"/>
                           </a:rPr>
-                          <a:t>1,232 languages</a:t>
+                          <a:t>1,229 languages</a:t>
                         </a:r>
                       </a:p>
                     </p:txBody>
@@ -6031,7 +6031,7 @@
                           <a:latin typeface="Helvetica" pitchFamily="2" charset="0"/>
                           <a:cs typeface="Times New Roman" panose="02020603050405020304" pitchFamily="18" charset="0"/>
                         </a:rPr>
-                        <a:t>643 languages</a:t>
+                        <a:t>644 languages</a:t>
                       </a:r>
                     </a:p>
                   </p:txBody>
@@ -6117,7 +6117,7 @@
                           <a:latin typeface="Helvetica" pitchFamily="2" charset="0"/>
                           <a:cs typeface="Times New Roman" panose="02020603050405020304" pitchFamily="18" charset="0"/>
                         </a:rPr>
-                        <a:t>1,697 languages</a:t>
+                        <a:t>1,696 languages</a:t>
                       </a:r>
                     </a:p>
                   </p:txBody>
@@ -6203,7 +6203,7 @@
                           <a:latin typeface="Helvetica" pitchFamily="2" charset="0"/>
                           <a:cs typeface="Times New Roman" panose="02020603050405020304" pitchFamily="18" charset="0"/>
                         </a:rPr>
-                        <a:t>554 languages</a:t>
+                        <a:t>555 languages</a:t>
                       </a:r>
                     </a:p>
                   </p:txBody>

</xml_diff>

<commit_message>
updates Figs 1 and 3
</commit_message>
<xml_diff>
--- a/plots/Fig1 paper overview.pptx
+++ b/plots/Fig1 paper overview.pptx
@@ -197,7 +197,7 @@
           <a:p>
             <a:fld id="{7FBD6D00-5174-A449-9D44-84A3CC40E9AF}" type="datetimeFigureOut">
               <a:rPr lang="en-US" smtClean="0"/>
-              <a:t>3/14/24</a:t>
+              <a:t>4/11/24</a:t>
             </a:fld>
             <a:endParaRPr lang="en-US"/>
           </a:p>
@@ -685,7 +685,7 @@
           <a:p>
             <a:fld id="{A2BAE022-C88F-2B41-9F90-7F832352A141}" type="datetimeFigureOut">
               <a:rPr lang="en-US" smtClean="0"/>
-              <a:t>3/14/24</a:t>
+              <a:t>4/11/24</a:t>
             </a:fld>
             <a:endParaRPr lang="en-US"/>
           </a:p>
@@ -855,7 +855,7 @@
           <a:p>
             <a:fld id="{A2BAE022-C88F-2B41-9F90-7F832352A141}" type="datetimeFigureOut">
               <a:rPr lang="en-US" smtClean="0"/>
-              <a:t>3/14/24</a:t>
+              <a:t>4/11/24</a:t>
             </a:fld>
             <a:endParaRPr lang="en-US"/>
           </a:p>
@@ -1035,7 +1035,7 @@
           <a:p>
             <a:fld id="{A2BAE022-C88F-2B41-9F90-7F832352A141}" type="datetimeFigureOut">
               <a:rPr lang="en-US" smtClean="0"/>
-              <a:t>3/14/24</a:t>
+              <a:t>4/11/24</a:t>
             </a:fld>
             <a:endParaRPr lang="en-US"/>
           </a:p>
@@ -1205,7 +1205,7 @@
           <a:p>
             <a:fld id="{A2BAE022-C88F-2B41-9F90-7F832352A141}" type="datetimeFigureOut">
               <a:rPr lang="en-US" smtClean="0"/>
-              <a:t>3/14/24</a:t>
+              <a:t>4/11/24</a:t>
             </a:fld>
             <a:endParaRPr lang="en-US"/>
           </a:p>
@@ -1449,7 +1449,7 @@
           <a:p>
             <a:fld id="{A2BAE022-C88F-2B41-9F90-7F832352A141}" type="datetimeFigureOut">
               <a:rPr lang="en-US" smtClean="0"/>
-              <a:t>3/14/24</a:t>
+              <a:t>4/11/24</a:t>
             </a:fld>
             <a:endParaRPr lang="en-US"/>
           </a:p>
@@ -1681,7 +1681,7 @@
           <a:p>
             <a:fld id="{A2BAE022-C88F-2B41-9F90-7F832352A141}" type="datetimeFigureOut">
               <a:rPr lang="en-US" smtClean="0"/>
-              <a:t>3/14/24</a:t>
+              <a:t>4/11/24</a:t>
             </a:fld>
             <a:endParaRPr lang="en-US"/>
           </a:p>
@@ -2048,7 +2048,7 @@
           <a:p>
             <a:fld id="{A2BAE022-C88F-2B41-9F90-7F832352A141}" type="datetimeFigureOut">
               <a:rPr lang="en-US" smtClean="0"/>
-              <a:t>3/14/24</a:t>
+              <a:t>4/11/24</a:t>
             </a:fld>
             <a:endParaRPr lang="en-US"/>
           </a:p>
@@ -2166,7 +2166,7 @@
           <a:p>
             <a:fld id="{A2BAE022-C88F-2B41-9F90-7F832352A141}" type="datetimeFigureOut">
               <a:rPr lang="en-US" smtClean="0"/>
-              <a:t>3/14/24</a:t>
+              <a:t>4/11/24</a:t>
             </a:fld>
             <a:endParaRPr lang="en-US"/>
           </a:p>
@@ -2261,7 +2261,7 @@
           <a:p>
             <a:fld id="{A2BAE022-C88F-2B41-9F90-7F832352A141}" type="datetimeFigureOut">
               <a:rPr lang="en-US" smtClean="0"/>
-              <a:t>3/14/24</a:t>
+              <a:t>4/11/24</a:t>
             </a:fld>
             <a:endParaRPr lang="en-US"/>
           </a:p>
@@ -2538,7 +2538,7 @@
           <a:p>
             <a:fld id="{A2BAE022-C88F-2B41-9F90-7F832352A141}" type="datetimeFigureOut">
               <a:rPr lang="en-US" smtClean="0"/>
-              <a:t>3/14/24</a:t>
+              <a:t>4/11/24</a:t>
             </a:fld>
             <a:endParaRPr lang="en-US"/>
           </a:p>
@@ -2795,7 +2795,7 @@
           <a:p>
             <a:fld id="{A2BAE022-C88F-2B41-9F90-7F832352A141}" type="datetimeFigureOut">
               <a:rPr lang="en-US" smtClean="0"/>
-              <a:t>3/14/24</a:t>
+              <a:t>4/11/24</a:t>
             </a:fld>
             <a:endParaRPr lang="en-US"/>
           </a:p>
@@ -3008,7 +3008,7 @@
           <a:p>
             <a:fld id="{A2BAE022-C88F-2B41-9F90-7F832352A141}" type="datetimeFigureOut">
               <a:rPr lang="en-US" smtClean="0"/>
-              <a:t>3/14/24</a:t>
+              <a:t>4/11/24</a:t>
             </a:fld>
             <a:endParaRPr lang="en-US"/>
           </a:p>
@@ -3703,9 +3703,9 @@
                           <p:grpSpPr>
                             <a:xfrm>
                               <a:off x="3910590" y="4472565"/>
-                              <a:ext cx="7625819" cy="1153541"/>
+                              <a:ext cx="7625819" cy="1174313"/>
                               <a:chOff x="3206956" y="1996059"/>
-                              <a:chExt cx="7625819" cy="1153541"/>
+                              <a:chExt cx="7625819" cy="1174313"/>
                             </a:xfrm>
                           </p:grpSpPr>
                           <p:sp>
@@ -3795,61 +3795,12 @@
                             </p:nvGrpSpPr>
                             <p:grpSpPr>
                               <a:xfrm>
-                                <a:off x="3206956" y="2003460"/>
-                                <a:ext cx="1831177" cy="1134254"/>
-                                <a:chOff x="3234252" y="1323629"/>
-                                <a:chExt cx="1831177" cy="1134254"/>
+                                <a:off x="3206956" y="2587901"/>
+                                <a:ext cx="1831177" cy="582471"/>
+                                <a:chOff x="3234252" y="1908070"/>
+                                <a:chExt cx="1831177" cy="582471"/>
                               </a:xfrm>
                             </p:grpSpPr>
-                            <p:sp>
-                              <p:nvSpPr>
-                                <p:cNvPr id="74" name="TextBox 73">
-                                  <a:extLst>
-                                    <a:ext uri="{FF2B5EF4-FFF2-40B4-BE49-F238E27FC236}">
-                                      <a16:creationId xmlns:a16="http://schemas.microsoft.com/office/drawing/2014/main" id="{E3D978C7-CB9E-6418-87BC-E6E0F0BD975B}"/>
-                                    </a:ext>
-                                  </a:extLst>
-                                </p:cNvPr>
-                                <p:cNvSpPr txBox="1"/>
-                                <p:nvPr/>
-                              </p:nvSpPr>
-                              <p:spPr>
-                                <a:xfrm>
-                                  <a:off x="3252000" y="1323629"/>
-                                  <a:ext cx="1795684" cy="461665"/>
-                                </a:xfrm>
-                                <a:prstGeom prst="rect">
-                                  <a:avLst/>
-                                </a:prstGeom>
-                                <a:noFill/>
-                              </p:spPr>
-                              <p:txBody>
-                                <a:bodyPr wrap="none" rtlCol="0">
-                                  <a:spAutoFit/>
-                                </a:bodyPr>
-                                <a:lstStyle/>
-                                <a:p>
-                                  <a:pPr algn="ctr"/>
-                                  <a:r>
-                                    <a:rPr lang="en-US" sz="1200" b="1" dirty="0">
-                                      <a:latin typeface="Helvetica" pitchFamily="2" charset="0"/>
-                                      <a:cs typeface="Times New Roman" panose="02020603050405020304" pitchFamily="18" charset="0"/>
-                                    </a:rPr>
-                                    <a:t>Step 1</a:t>
-                                  </a:r>
-                                </a:p>
-                                <a:p>
-                                  <a:pPr algn="ctr"/>
-                                  <a:r>
-                                    <a:rPr lang="en-US" sz="1200" b="1" dirty="0">
-                                      <a:latin typeface="Helvetica" pitchFamily="2" charset="0"/>
-                                      <a:cs typeface="Times New Roman" panose="02020603050405020304" pitchFamily="18" charset="0"/>
-                                    </a:rPr>
-                                    <a:t>logical independence </a:t>
-                                  </a:r>
-                                </a:p>
-                              </p:txBody>
-                            </p:sp>
                             <p:cxnSp>
                               <p:nvCxnSpPr>
                                 <p:cNvPr id="75" name="Straight Arrow Connector 74">
@@ -3866,7 +3817,7 @@
                               </p:nvCxnSpPr>
                               <p:spPr>
                                 <a:xfrm flipH="1">
-                                  <a:off x="3234252" y="1875412"/>
+                                  <a:off x="3234252" y="1908070"/>
                                   <a:ext cx="1831177" cy="0"/>
                                 </a:xfrm>
                                 <a:prstGeom prst="straightConnector1">
@@ -3910,7 +3861,7 @@
                               </p:nvSpPr>
                               <p:spPr>
                                 <a:xfrm>
-                                  <a:off x="3303949" y="1903885"/>
+                                  <a:off x="3303949" y="1936543"/>
                                   <a:ext cx="1638590" cy="553998"/>
                                 </a:xfrm>
                                 <a:prstGeom prst="rect">
@@ -3940,7 +3891,7 @@
                                       <a:latin typeface="Helvetica" pitchFamily="2" charset="0"/>
                                       <a:cs typeface="Times New Roman" panose="02020603050405020304" pitchFamily="18" charset="0"/>
                                     </a:rPr>
-                                    <a:t>736 removals</a:t>
+                                    <a:t>736 exclusions</a:t>
                                   </a:r>
                                 </a:p>
                                 <a:p>
@@ -4188,7 +4139,7 @@
                                       <a:latin typeface="Helvetica" pitchFamily="2" charset="0"/>
                                       <a:cs typeface="Times New Roman" panose="02020603050405020304" pitchFamily="18" charset="0"/>
                                     </a:rPr>
-                                    <a:t>49 removals</a:t>
+                                    <a:t>49 exclusions</a:t>
                                   </a:r>
                                 </a:p>
                                 <a:p>
@@ -4541,10 +4492,10 @@
                             </p:nvGrpSpPr>
                             <p:grpSpPr>
                               <a:xfrm>
-                                <a:off x="3910590" y="4173620"/>
-                                <a:ext cx="7496425" cy="1153541"/>
-                                <a:chOff x="3206956" y="1697114"/>
-                                <a:chExt cx="7496425" cy="1153541"/>
+                                <a:off x="3910590" y="4041414"/>
+                                <a:ext cx="7496425" cy="1285747"/>
+                                <a:chOff x="3206956" y="1564908"/>
+                                <a:chExt cx="7496425" cy="1285747"/>
                               </a:xfrm>
                             </p:grpSpPr>
                             <p:sp>
@@ -4634,10 +4585,10 @@
                               </p:nvGrpSpPr>
                               <p:grpSpPr>
                                 <a:xfrm>
-                                  <a:off x="3206956" y="1704515"/>
-                                  <a:ext cx="1831177" cy="1134254"/>
-                                  <a:chOff x="3234252" y="1024684"/>
-                                  <a:chExt cx="1831177" cy="1134254"/>
+                                  <a:off x="3206956" y="1564908"/>
+                                  <a:ext cx="1831177" cy="1273861"/>
+                                  <a:chOff x="3234252" y="885077"/>
+                                  <a:chExt cx="1831177" cy="1273861"/>
                                 </a:xfrm>
                               </p:grpSpPr>
                               <p:sp>
@@ -4654,8 +4605,8 @@
                                 </p:nvSpPr>
                                 <p:spPr>
                                   <a:xfrm>
-                                    <a:off x="3252000" y="1024684"/>
-                                    <a:ext cx="1795684" cy="461665"/>
+                                    <a:off x="3252000" y="885077"/>
+                                    <a:ext cx="1795683" cy="646331"/>
                                   </a:xfrm>
                                   <a:prstGeom prst="rect">
                                     <a:avLst/>
@@ -4675,6 +4626,16 @@
                                         <a:cs typeface="Times New Roman" panose="02020603050405020304" pitchFamily="18" charset="0"/>
                                       </a:rPr>
                                       <a:t>Step 1</a:t>
+                                    </a:r>
+                                  </a:p>
+                                  <a:p>
+                                    <a:pPr algn="ctr"/>
+                                    <a:r>
+                                      <a:rPr lang="en-US" sz="1200" b="1" dirty="0">
+                                        <a:latin typeface="Helvetica" pitchFamily="2" charset="0"/>
+                                        <a:cs typeface="Times New Roman" panose="02020603050405020304" pitchFamily="18" charset="0"/>
+                                      </a:rPr>
+                                      <a:t>feature design +</a:t>
                                     </a:r>
                                   </a:p>
                                   <a:p>
@@ -4779,7 +4740,7 @@
                                         <a:latin typeface="Helvetica" pitchFamily="2" charset="0"/>
                                         <a:cs typeface="Times New Roman" panose="02020603050405020304" pitchFamily="18" charset="0"/>
                                       </a:rPr>
-                                      <a:t>100 removals</a:t>
+                                      <a:t>100 exclusions</a:t>
                                     </a:r>
                                   </a:p>
                                   <a:p>
@@ -5027,7 +4988,7 @@
                                         <a:latin typeface="Helvetica" pitchFamily="2" charset="0"/>
                                         <a:cs typeface="Times New Roman" panose="02020603050405020304" pitchFamily="18" charset="0"/>
                                       </a:rPr>
-                                      <a:t>45 removals</a:t>
+                                      <a:t>45 exclusions</a:t>
                                     </a:r>
                                   </a:p>
                                   <a:p>
@@ -7099,6 +7060,65 @@
           </p:spPr>
         </p:pic>
       </p:grpSp>
+      <p:sp>
+        <p:nvSpPr>
+          <p:cNvPr id="5" name="TextBox 4">
+            <a:extLst>
+              <a:ext uri="{FF2B5EF4-FFF2-40B4-BE49-F238E27FC236}">
+                <a16:creationId xmlns:a16="http://schemas.microsoft.com/office/drawing/2014/main" id="{EE9C143F-09C8-8EB1-69AC-57025EAB358F}"/>
+              </a:ext>
+            </a:extLst>
+          </p:cNvPr>
+          <p:cNvSpPr txBox="1"/>
+          <p:nvPr/>
+        </p:nvSpPr>
+        <p:spPr>
+          <a:xfrm>
+            <a:off x="3509416" y="4514374"/>
+            <a:ext cx="1795683" cy="646331"/>
+          </a:xfrm>
+          <a:prstGeom prst="rect">
+            <a:avLst/>
+          </a:prstGeom>
+          <a:noFill/>
+        </p:spPr>
+        <p:txBody>
+          <a:bodyPr wrap="none" rtlCol="0">
+            <a:spAutoFit/>
+          </a:bodyPr>
+          <a:lstStyle/>
+          <a:p>
+            <a:pPr algn="ctr"/>
+            <a:r>
+              <a:rPr lang="en-US" sz="1200" b="1" dirty="0">
+                <a:latin typeface="Helvetica" pitchFamily="2" charset="0"/>
+                <a:cs typeface="Times New Roman" panose="02020603050405020304" pitchFamily="18" charset="0"/>
+              </a:rPr>
+              <a:t>Step 1</a:t>
+            </a:r>
+          </a:p>
+          <a:p>
+            <a:pPr algn="ctr"/>
+            <a:r>
+              <a:rPr lang="en-US" sz="1200" b="1" dirty="0">
+                <a:latin typeface="Helvetica" pitchFamily="2" charset="0"/>
+                <a:cs typeface="Times New Roman" panose="02020603050405020304" pitchFamily="18" charset="0"/>
+              </a:rPr>
+              <a:t>feature design +</a:t>
+            </a:r>
+          </a:p>
+          <a:p>
+            <a:pPr algn="ctr"/>
+            <a:r>
+              <a:rPr lang="en-US" sz="1200" b="1" dirty="0">
+                <a:latin typeface="Helvetica" pitchFamily="2" charset="0"/>
+                <a:cs typeface="Times New Roman" panose="02020603050405020304" pitchFamily="18" charset="0"/>
+              </a:rPr>
+              <a:t>logical independence </a:t>
+            </a:r>
+          </a:p>
+        </p:txBody>
+      </p:sp>
     </p:spTree>
     <p:extLst>
       <p:ext uri="{BB962C8B-B14F-4D97-AF65-F5344CB8AC3E}">

</xml_diff>

<commit_message>
comprehensive updates including to two falsely coded grambank features and downstream changes
</commit_message>
<xml_diff>
--- a/plots/Fig1 paper overview.pptx
+++ b/plots/Fig1 paper overview.pptx
@@ -197,7 +197,7 @@
           <a:p>
             <a:fld id="{7FBD6D00-5174-A449-9D44-84A3CC40E9AF}" type="datetimeFigureOut">
               <a:rPr lang="en-US" smtClean="0"/>
-              <a:t>4/11/24</a:t>
+              <a:t>6/25/24</a:t>
             </a:fld>
             <a:endParaRPr lang="en-US"/>
           </a:p>
@@ -685,7 +685,7 @@
           <a:p>
             <a:fld id="{A2BAE022-C88F-2B41-9F90-7F832352A141}" type="datetimeFigureOut">
               <a:rPr lang="en-US" smtClean="0"/>
-              <a:t>4/11/24</a:t>
+              <a:t>6/25/24</a:t>
             </a:fld>
             <a:endParaRPr lang="en-US"/>
           </a:p>
@@ -855,7 +855,7 @@
           <a:p>
             <a:fld id="{A2BAE022-C88F-2B41-9F90-7F832352A141}" type="datetimeFigureOut">
               <a:rPr lang="en-US" smtClean="0"/>
-              <a:t>4/11/24</a:t>
+              <a:t>6/25/24</a:t>
             </a:fld>
             <a:endParaRPr lang="en-US"/>
           </a:p>
@@ -1035,7 +1035,7 @@
           <a:p>
             <a:fld id="{A2BAE022-C88F-2B41-9F90-7F832352A141}" type="datetimeFigureOut">
               <a:rPr lang="en-US" smtClean="0"/>
-              <a:t>4/11/24</a:t>
+              <a:t>6/25/24</a:t>
             </a:fld>
             <a:endParaRPr lang="en-US"/>
           </a:p>
@@ -1205,7 +1205,7 @@
           <a:p>
             <a:fld id="{A2BAE022-C88F-2B41-9F90-7F832352A141}" type="datetimeFigureOut">
               <a:rPr lang="en-US" smtClean="0"/>
-              <a:t>4/11/24</a:t>
+              <a:t>6/25/24</a:t>
             </a:fld>
             <a:endParaRPr lang="en-US"/>
           </a:p>
@@ -1449,7 +1449,7 @@
           <a:p>
             <a:fld id="{A2BAE022-C88F-2B41-9F90-7F832352A141}" type="datetimeFigureOut">
               <a:rPr lang="en-US" smtClean="0"/>
-              <a:t>4/11/24</a:t>
+              <a:t>6/25/24</a:t>
             </a:fld>
             <a:endParaRPr lang="en-US"/>
           </a:p>
@@ -1681,7 +1681,7 @@
           <a:p>
             <a:fld id="{A2BAE022-C88F-2B41-9F90-7F832352A141}" type="datetimeFigureOut">
               <a:rPr lang="en-US" smtClean="0"/>
-              <a:t>4/11/24</a:t>
+              <a:t>6/25/24</a:t>
             </a:fld>
             <a:endParaRPr lang="en-US"/>
           </a:p>
@@ -2048,7 +2048,7 @@
           <a:p>
             <a:fld id="{A2BAE022-C88F-2B41-9F90-7F832352A141}" type="datetimeFigureOut">
               <a:rPr lang="en-US" smtClean="0"/>
-              <a:t>4/11/24</a:t>
+              <a:t>6/25/24</a:t>
             </a:fld>
             <a:endParaRPr lang="en-US"/>
           </a:p>
@@ -2166,7 +2166,7 @@
           <a:p>
             <a:fld id="{A2BAE022-C88F-2B41-9F90-7F832352A141}" type="datetimeFigureOut">
               <a:rPr lang="en-US" smtClean="0"/>
-              <a:t>4/11/24</a:t>
+              <a:t>6/25/24</a:t>
             </a:fld>
             <a:endParaRPr lang="en-US"/>
           </a:p>
@@ -2261,7 +2261,7 @@
           <a:p>
             <a:fld id="{A2BAE022-C88F-2B41-9F90-7F832352A141}" type="datetimeFigureOut">
               <a:rPr lang="en-US" smtClean="0"/>
-              <a:t>4/11/24</a:t>
+              <a:t>6/25/24</a:t>
             </a:fld>
             <a:endParaRPr lang="en-US"/>
           </a:p>
@@ -2538,7 +2538,7 @@
           <a:p>
             <a:fld id="{A2BAE022-C88F-2B41-9F90-7F832352A141}" type="datetimeFigureOut">
               <a:rPr lang="en-US" smtClean="0"/>
-              <a:t>4/11/24</a:t>
+              <a:t>6/25/24</a:t>
             </a:fld>
             <a:endParaRPr lang="en-US"/>
           </a:p>
@@ -2795,7 +2795,7 @@
           <a:p>
             <a:fld id="{A2BAE022-C88F-2B41-9F90-7F832352A141}" type="datetimeFigureOut">
               <a:rPr lang="en-US" smtClean="0"/>
-              <a:t>4/11/24</a:t>
+              <a:t>6/25/24</a:t>
             </a:fld>
             <a:endParaRPr lang="en-US"/>
           </a:p>
@@ -3008,7 +3008,7 @@
           <a:p>
             <a:fld id="{A2BAE022-C88F-2B41-9F90-7F832352A141}" type="datetimeFigureOut">
               <a:rPr lang="en-US" smtClean="0"/>
-              <a:t>4/11/24</a:t>
+              <a:t>6/25/24</a:t>
             </a:fld>
             <a:endParaRPr lang="en-US"/>
           </a:p>
@@ -3427,10 +3427,10 @@
         </p:nvGrpSpPr>
         <p:grpSpPr>
           <a:xfrm>
-            <a:off x="513141" y="548158"/>
-            <a:ext cx="10839972" cy="8392101"/>
-            <a:chOff x="513141" y="548158"/>
-            <a:chExt cx="10839972" cy="8392101"/>
+            <a:off x="608522" y="548158"/>
+            <a:ext cx="10690858" cy="8392101"/>
+            <a:chOff x="608522" y="548158"/>
+            <a:chExt cx="10690858" cy="8392101"/>
           </a:xfrm>
         </p:grpSpPr>
         <p:grpSp>
@@ -3447,10 +3447,10 @@
           </p:nvGrpSpPr>
           <p:grpSpPr>
             <a:xfrm>
-              <a:off x="513141" y="548158"/>
-              <a:ext cx="10839972" cy="8392101"/>
-              <a:chOff x="857961" y="1392412"/>
-              <a:chExt cx="10839972" cy="8392101"/>
+              <a:off x="608522" y="548158"/>
+              <a:ext cx="10690858" cy="8392101"/>
+              <a:chOff x="953342" y="1392412"/>
+              <a:chExt cx="10690858" cy="8392101"/>
             </a:xfrm>
           </p:grpSpPr>
           <p:grpSp>
@@ -3467,10 +3467,10 @@
             </p:nvGrpSpPr>
             <p:grpSpPr>
               <a:xfrm>
-                <a:off x="857961" y="1392412"/>
-                <a:ext cx="10839972" cy="8392101"/>
-                <a:chOff x="879225" y="2398849"/>
-                <a:chExt cx="10839972" cy="8392101"/>
+                <a:off x="953342" y="1392412"/>
+                <a:ext cx="10690858" cy="8392101"/>
+                <a:chOff x="974606" y="2398849"/>
+                <a:chExt cx="10690858" cy="8392101"/>
               </a:xfrm>
             </p:grpSpPr>
             <p:grpSp>
@@ -3487,10 +3487,10 @@
               </p:nvGrpSpPr>
               <p:grpSpPr>
                 <a:xfrm>
-                  <a:off x="879225" y="2398849"/>
-                  <a:ext cx="10839972" cy="8392101"/>
-                  <a:chOff x="293589" y="2546333"/>
-                  <a:chExt cx="10839972" cy="8392101"/>
+                  <a:off x="974606" y="2398849"/>
+                  <a:ext cx="10690858" cy="8392101"/>
+                  <a:chOff x="388970" y="2546333"/>
+                  <a:chExt cx="10690858" cy="8392101"/>
                 </a:xfrm>
               </p:grpSpPr>
               <p:grpSp>
@@ -3507,10 +3507,10 @@
                 </p:nvGrpSpPr>
                 <p:grpSpPr>
                   <a:xfrm>
-                    <a:off x="293589" y="2546333"/>
-                    <a:ext cx="10786239" cy="8217615"/>
-                    <a:chOff x="285225" y="2686363"/>
-                    <a:chExt cx="10786239" cy="8217615"/>
+                    <a:off x="388970" y="2546333"/>
+                    <a:ext cx="10690858" cy="8198282"/>
+                    <a:chOff x="380606" y="2686363"/>
+                    <a:chExt cx="10690858" cy="8198282"/>
                   </a:xfrm>
                 </p:grpSpPr>
                 <p:grpSp>
@@ -3527,10 +3527,10 @@
                   </p:nvGrpSpPr>
                   <p:grpSpPr>
                     <a:xfrm>
-                      <a:off x="285225" y="2875438"/>
-                      <a:ext cx="10786239" cy="8028540"/>
-                      <a:chOff x="492963" y="2875439"/>
-                      <a:chExt cx="10786239" cy="8028540"/>
+                      <a:off x="380606" y="2891309"/>
+                      <a:ext cx="10690858" cy="7993336"/>
+                      <a:chOff x="588344" y="2891310"/>
+                      <a:chExt cx="10690858" cy="7993336"/>
                     </a:xfrm>
                   </p:grpSpPr>
                   <p:grpSp>
@@ -3547,10 +3547,10 @@
                     </p:nvGrpSpPr>
                     <p:grpSpPr>
                       <a:xfrm>
-                        <a:off x="492963" y="5947090"/>
-                        <a:ext cx="10786239" cy="4956889"/>
-                        <a:chOff x="326979" y="1400393"/>
-                        <a:chExt cx="10786239" cy="4956889"/>
+                        <a:off x="1215945" y="5947090"/>
+                        <a:ext cx="10063257" cy="4937556"/>
+                        <a:chOff x="1049961" y="1400393"/>
+                        <a:chExt cx="10063257" cy="4937556"/>
                       </a:xfrm>
                     </p:grpSpPr>
                     <p:sp>
@@ -3606,10 +3606,10 @@
                       </p:nvGrpSpPr>
                       <p:grpSpPr>
                         <a:xfrm>
-                          <a:off x="326979" y="2038766"/>
-                          <a:ext cx="10786239" cy="4318516"/>
-                          <a:chOff x="326979" y="2038766"/>
-                          <a:chExt cx="10786239" cy="4318516"/>
+                          <a:off x="1049961" y="2038766"/>
+                          <a:ext cx="10063257" cy="4299183"/>
+                          <a:chOff x="1049961" y="2038766"/>
+                          <a:chExt cx="10063257" cy="4299183"/>
                         </a:xfrm>
                       </p:grpSpPr>
                       <p:grpSp>
@@ -3703,9 +3703,9 @@
                           <p:grpSpPr>
                             <a:xfrm>
                               <a:off x="3910590" y="4472565"/>
-                              <a:ext cx="7625819" cy="1174313"/>
+                              <a:ext cx="7496425" cy="1174313"/>
                               <a:chOff x="3206956" y="1996059"/>
-                              <a:chExt cx="7625819" cy="1174313"/>
+                              <a:chExt cx="7496425" cy="1174313"/>
                             </a:xfrm>
                           </p:grpSpPr>
                           <p:sp>
@@ -3722,8 +3722,8 @@
                             </p:nvSpPr>
                             <p:spPr>
                               <a:xfrm>
-                                <a:off x="5153205" y="2245947"/>
-                                <a:ext cx="1580754" cy="646331"/>
+                                <a:off x="5285963" y="2245947"/>
+                                <a:ext cx="1354246" cy="646331"/>
                               </a:xfrm>
                               <a:prstGeom prst="rect">
                                 <a:avLst/>
@@ -3736,7 +3736,7 @@
                               </a:ln>
                             </p:spPr>
                             <p:txBody>
-                              <a:bodyPr wrap="none" rtlCol="0">
+                              <a:bodyPr wrap="square" rtlCol="0">
                                 <a:spAutoFit/>
                               </a:bodyPr>
                               <a:lstStyle/>
@@ -3750,7 +3750,7 @@
                                     <a:latin typeface="Helvetica" pitchFamily="2" charset="0"/>
                                     <a:cs typeface="Times New Roman" panose="02020603050405020304" pitchFamily="18" charset="0"/>
                                   </a:rPr>
-                                  <a:t>TypLinkInd logical:</a:t>
+                                  <a:t>TLI logical:</a:t>
                                 </a:r>
                               </a:p>
                               <a:p>
@@ -3921,8 +3921,8 @@
                             </p:nvSpPr>
                             <p:spPr>
                               <a:xfrm>
-                                <a:off x="9037330" y="2260550"/>
-                                <a:ext cx="1795445" cy="646331"/>
+                                <a:off x="9249891" y="2260550"/>
+                                <a:ext cx="1453490" cy="646331"/>
                               </a:xfrm>
                               <a:prstGeom prst="rect">
                                 <a:avLst/>
@@ -3949,7 +3949,7 @@
                                     <a:latin typeface="Helvetica" pitchFamily="2" charset="0"/>
                                     <a:cs typeface="Times New Roman" panose="02020603050405020304" pitchFamily="18" charset="0"/>
                                   </a:rPr>
-                                  <a:t>TypLinkInd statistical:</a:t>
+                                  <a:t>TLI statistical:</a:t>
                                 </a:r>
                               </a:p>
                               <a:p>
@@ -4090,7 +4090,7 @@
                                       <a:latin typeface="Helvetica" pitchFamily="2" charset="0"/>
                                       <a:cs typeface="Times New Roman" panose="02020603050405020304" pitchFamily="18" charset="0"/>
                                     </a:rPr>
-                                    <a:t>statistical independence* </a:t>
+                                    <a:t>statistical independence </a:t>
                                   </a:r>
                                 </a:p>
                               </p:txBody>
@@ -4171,8 +4171,8 @@
                         </p:nvSpPr>
                         <p:spPr>
                           <a:xfrm>
-                            <a:off x="326979" y="5803284"/>
-                            <a:ext cx="2703497" cy="553998"/>
+                            <a:off x="1049961" y="5783951"/>
+                            <a:ext cx="1255472" cy="553998"/>
                           </a:xfrm>
                           <a:prstGeom prst="rect">
                             <a:avLst/>
@@ -4190,7 +4190,7 @@
                                 <a:latin typeface="Helvetica" pitchFamily="2" charset="0"/>
                                 <a:cs typeface="Times New Roman" panose="02020603050405020304" pitchFamily="18" charset="0"/>
                               </a:rPr>
-                              <a:t>B. TypLinkInd</a:t>
+                              <a:t>B. TLI</a:t>
                             </a:r>
                           </a:p>
                         </p:txBody>
@@ -4211,10 +4211,10 @@
                     </p:nvGrpSpPr>
                     <p:grpSpPr>
                       <a:xfrm>
-                        <a:off x="588344" y="2875439"/>
-                        <a:ext cx="10690858" cy="7117925"/>
-                        <a:chOff x="588344" y="2875439"/>
-                        <a:chExt cx="10690858" cy="7117925"/>
+                        <a:off x="588344" y="2891310"/>
+                        <a:ext cx="10690858" cy="7102054"/>
+                        <a:chOff x="588344" y="2891310"/>
+                        <a:chExt cx="10690858" cy="7102054"/>
                       </a:xfrm>
                     </p:grpSpPr>
                     <p:grpSp>
@@ -4231,10 +4231,10 @@
                       </p:nvGrpSpPr>
                       <p:grpSpPr>
                         <a:xfrm>
-                          <a:off x="625478" y="2875439"/>
-                          <a:ext cx="10653724" cy="2766815"/>
-                          <a:chOff x="459494" y="591643"/>
-                          <a:chExt cx="10653724" cy="2766815"/>
+                          <a:off x="625478" y="2891310"/>
+                          <a:ext cx="10653724" cy="2750944"/>
+                          <a:chOff x="459494" y="607514"/>
+                          <a:chExt cx="10653724" cy="2750944"/>
                         </a:xfrm>
                       </p:grpSpPr>
                       <p:grpSp>
@@ -4396,10 +4396,10 @@
                         </p:nvGrpSpPr>
                         <p:grpSpPr>
                           <a:xfrm>
-                            <a:off x="493966" y="591643"/>
-                            <a:ext cx="10619252" cy="2766815"/>
-                            <a:chOff x="493966" y="591643"/>
-                            <a:chExt cx="10619252" cy="2766815"/>
+                            <a:off x="1065164" y="607514"/>
+                            <a:ext cx="10048054" cy="2750944"/>
+                            <a:chOff x="1065164" y="607514"/>
+                            <a:chExt cx="10048054" cy="2750944"/>
                           </a:xfrm>
                         </p:grpSpPr>
                         <p:grpSp>
@@ -4540,7 +4540,7 @@
                                       <a:latin typeface="Helvetica" pitchFamily="2" charset="0"/>
                                       <a:cs typeface="Times New Roman" panose="02020603050405020304" pitchFamily="18" charset="0"/>
                                     </a:rPr>
-                                    <a:t>GBInd logical:</a:t>
+                                    <a:t>GBI logical:</a:t>
                                   </a:r>
                                 </a:p>
                                 <a:p>
@@ -4798,7 +4798,7 @@
                                       <a:latin typeface="Helvetica" pitchFamily="2" charset="0"/>
                                       <a:cs typeface="Times New Roman" panose="02020603050405020304" pitchFamily="18" charset="0"/>
                                     </a:rPr>
-                                    <a:t>GBInd statistical:</a:t>
+                                    <a:t>GBI statistical:</a:t>
                                   </a:r>
                                 </a:p>
                                 <a:p>
@@ -4939,7 +4939,7 @@
                                         <a:latin typeface="Helvetica" pitchFamily="2" charset="0"/>
                                         <a:cs typeface="Times New Roman" panose="02020603050405020304" pitchFamily="18" charset="0"/>
                                       </a:rPr>
-                                      <a:t>statistical independence* </a:t>
+                                      <a:t>statistical independence </a:t>
                                     </a:r>
                                   </a:p>
                                 </p:txBody>
@@ -4978,7 +4978,7 @@
                                         <a:latin typeface="Helvetica" pitchFamily="2" charset="0"/>
                                         <a:cs typeface="Times New Roman" panose="02020603050405020304" pitchFamily="18" charset="0"/>
                                       </a:rPr>
-                                      <a:t>158 retentions</a:t>
+                                      <a:t>157 retentions</a:t>
                                     </a:r>
                                   </a:p>
                                   <a:p>
@@ -4988,7 +4988,7 @@
                                         <a:latin typeface="Helvetica" pitchFamily="2" charset="0"/>
                                         <a:cs typeface="Times New Roman" panose="02020603050405020304" pitchFamily="18" charset="0"/>
                                       </a:rPr>
-                                      <a:t>45 exclusions</a:t>
+                                      <a:t>46 exclusions</a:t>
                                     </a:r>
                                   </a:p>
                                   <a:p>
@@ -4998,7 +4998,7 @@
                                         <a:latin typeface="Helvetica" pitchFamily="2" charset="0"/>
                                         <a:cs typeface="Times New Roman" panose="02020603050405020304" pitchFamily="18" charset="0"/>
                                       </a:rPr>
-                                      <a:t>38 merges/modifications</a:t>
+                                      <a:t>39 merges/modifications</a:t>
                                     </a:r>
                                   </a:p>
                                 </p:txBody>
@@ -5020,8 +5020,8 @@
                           </p:nvSpPr>
                           <p:spPr>
                             <a:xfrm>
-                              <a:off x="493966" y="591643"/>
-                              <a:ext cx="1832553" cy="553998"/>
+                              <a:off x="1065164" y="607514"/>
+                              <a:ext cx="1361270" cy="553998"/>
                             </a:xfrm>
                             <a:prstGeom prst="rect">
                               <a:avLst/>
@@ -5039,7 +5039,7 @@
                                   <a:latin typeface="Helvetica" pitchFamily="2" charset="0"/>
                                   <a:cs typeface="Times New Roman" panose="02020603050405020304" pitchFamily="18" charset="0"/>
                                 </a:rPr>
-                                <a:t>A. GBInd</a:t>
+                                <a:t>A. GBI</a:t>
                               </a:r>
                             </a:p>
                           </p:txBody>
@@ -5673,7 +5673,7 @@
                             <a:latin typeface="Helvetica" pitchFamily="2" charset="0"/>
                             <a:cs typeface="Times New Roman" panose="02020603050405020304" pitchFamily="18" charset="0"/>
                           </a:rPr>
-                          <a:t>GBInd statistical,</a:t>
+                          <a:t>GBI statistical,</a:t>
                         </a:r>
                       </a:p>
                       <a:p>
@@ -5712,7 +5712,7 @@
                             <a:latin typeface="Helvetica" pitchFamily="2" charset="0"/>
                             <a:cs typeface="Times New Roman" panose="02020603050405020304" pitchFamily="18" charset="0"/>
                           </a:rPr>
-                          <a:t>1,144 languages</a:t>
+                          <a:t>1,140 languages</a:t>
                         </a:r>
                       </a:p>
                     </p:txBody>
@@ -5759,7 +5759,7 @@
                             <a:latin typeface="Helvetica" pitchFamily="2" charset="0"/>
                             <a:cs typeface="Times New Roman" panose="02020603050405020304" pitchFamily="18" charset="0"/>
                           </a:rPr>
-                          <a:t>GBInd logical,</a:t>
+                          <a:t>GBI logical,</a:t>
                         </a:r>
                       </a:p>
                       <a:p>
@@ -5798,7 +5798,7 @@
                             <a:latin typeface="Helvetica" pitchFamily="2" charset="0"/>
                             <a:cs typeface="Times New Roman" panose="02020603050405020304" pitchFamily="18" charset="0"/>
                           </a:rPr>
-                          <a:t>1,229 languages</a:t>
+                          <a:t>1,223 languages</a:t>
                         </a:r>
                       </a:p>
                     </p:txBody>
@@ -5819,10 +5819,10 @@
                 </p:nvGrpSpPr>
                 <p:grpSpPr>
                   <a:xfrm>
-                    <a:off x="3328916" y="10107437"/>
-                    <a:ext cx="7804645" cy="830997"/>
-                    <a:chOff x="3328916" y="10107437"/>
-                    <a:chExt cx="7804645" cy="830997"/>
+                    <a:off x="3568366" y="10107437"/>
+                    <a:ext cx="7287939" cy="830997"/>
+                    <a:chOff x="3568366" y="10107437"/>
+                    <a:chExt cx="7287939" cy="830997"/>
                   </a:xfrm>
                 </p:grpSpPr>
                 <p:sp>
@@ -5839,8 +5839,8 @@
                   </p:nvSpPr>
                   <p:spPr>
                     <a:xfrm>
-                      <a:off x="3328916" y="10107437"/>
-                      <a:ext cx="1792350" cy="830997"/>
+                      <a:off x="3568366" y="10107437"/>
+                      <a:ext cx="1322361" cy="830997"/>
                     </a:xfrm>
                     <a:prstGeom prst="rect">
                       <a:avLst/>
@@ -5867,7 +5867,7 @@
                           <a:latin typeface="Helvetica" pitchFamily="2" charset="0"/>
                           <a:cs typeface="Times New Roman" panose="02020603050405020304" pitchFamily="18" charset="0"/>
                         </a:rPr>
-                        <a:t>TypLinkInd logical,</a:t>
+                        <a:t>TLI logical,</a:t>
                       </a:r>
                     </a:p>
                     <a:p>
@@ -5925,8 +5925,8 @@
                   </p:nvSpPr>
                   <p:spPr>
                     <a:xfrm>
-                      <a:off x="9341211" y="10107437"/>
-                      <a:ext cx="1792350" cy="830997"/>
+                      <a:off x="9618466" y="10107437"/>
+                      <a:ext cx="1237839" cy="830997"/>
                     </a:xfrm>
                     <a:prstGeom prst="rect">
                       <a:avLst/>
@@ -5953,7 +5953,7 @@
                           <a:latin typeface="Helvetica" pitchFamily="2" charset="0"/>
                           <a:cs typeface="Times New Roman" panose="02020603050405020304" pitchFamily="18" charset="0"/>
                         </a:rPr>
-                        <a:t>TypLinkInd statistical,</a:t>
+                        <a:t>TLI statistical,</a:t>
                       </a:r>
                     </a:p>
                     <a:p>
@@ -6011,8 +6011,8 @@
                   </p:nvSpPr>
                   <p:spPr>
                     <a:xfrm>
-                      <a:off x="7576434" y="10107437"/>
-                      <a:ext cx="1792350" cy="830997"/>
+                      <a:off x="7814416" y="10107437"/>
+                      <a:ext cx="1316386" cy="830997"/>
                     </a:xfrm>
                     <a:prstGeom prst="rect">
                       <a:avLst/>
@@ -6039,7 +6039,7 @@
                           <a:latin typeface="Helvetica" pitchFamily="2" charset="0"/>
                           <a:cs typeface="Times New Roman" panose="02020603050405020304" pitchFamily="18" charset="0"/>
                         </a:rPr>
-                        <a:t>TypLinkInd statistical,</a:t>
+                        <a:t>TLI statistical,</a:t>
                       </a:r>
                     </a:p>
                     <a:p>
@@ -6097,8 +6097,8 @@
                   </p:nvSpPr>
                   <p:spPr>
                     <a:xfrm>
-                      <a:off x="5121266" y="10107437"/>
-                      <a:ext cx="1792350" cy="830997"/>
+                      <a:off x="5446876" y="10107437"/>
+                      <a:ext cx="1322362" cy="830997"/>
                     </a:xfrm>
                     <a:prstGeom prst="rect">
                       <a:avLst/>
@@ -6125,7 +6125,7 @@
                           <a:latin typeface="Helvetica" pitchFamily="2" charset="0"/>
                           <a:cs typeface="Times New Roman" panose="02020603050405020304" pitchFamily="18" charset="0"/>
                         </a:rPr>
-                        <a:t>TypLinkInd logical,</a:t>
+                        <a:t>TLI logical,</a:t>
                       </a:r>
                     </a:p>
                     <a:p>
@@ -6800,9 +6800,9 @@
                 <p:nvPr/>
               </p:nvCxnSpPr>
               <p:spPr>
-                <a:xfrm flipV="1">
-                  <a:off x="4810727" y="9556523"/>
-                  <a:ext cx="0" cy="403430"/>
+                <a:xfrm flipH="1" flipV="1">
+                  <a:off x="4810727" y="9568176"/>
+                  <a:ext cx="4456" cy="391777"/>
                 </a:xfrm>
                 <a:prstGeom prst="straightConnector1">
                   <a:avLst/>
@@ -6851,8 +6851,8 @@
               </p:nvCxnSpPr>
               <p:spPr>
                 <a:xfrm flipV="1">
-                  <a:off x="6603077" y="9556867"/>
-                  <a:ext cx="0" cy="403086"/>
+                  <a:off x="6693693" y="9568176"/>
+                  <a:ext cx="3947" cy="391777"/>
                 </a:xfrm>
                 <a:prstGeom prst="straightConnector1">
                   <a:avLst/>

</xml_diff>

<commit_message>
update plots (caption removal; typo correction)
</commit_message>
<xml_diff>
--- a/plots/Fig1 paper overview.pptx
+++ b/plots/Fig1 paper overview.pptx
@@ -197,7 +197,7 @@
           <a:p>
             <a:fld id="{7FBD6D00-5174-A449-9D44-84A3CC40E9AF}" type="datetimeFigureOut">
               <a:rPr lang="en-US" smtClean="0"/>
-              <a:t>11/6/24</a:t>
+              <a:t>11/13/24</a:t>
             </a:fld>
             <a:endParaRPr lang="en-US"/>
           </a:p>
@@ -685,7 +685,7 @@
           <a:p>
             <a:fld id="{A2BAE022-C88F-2B41-9F90-7F832352A141}" type="datetimeFigureOut">
               <a:rPr lang="en-US" smtClean="0"/>
-              <a:t>11/6/24</a:t>
+              <a:t>11/13/24</a:t>
             </a:fld>
             <a:endParaRPr lang="en-US"/>
           </a:p>
@@ -855,7 +855,7 @@
           <a:p>
             <a:fld id="{A2BAE022-C88F-2B41-9F90-7F832352A141}" type="datetimeFigureOut">
               <a:rPr lang="en-US" smtClean="0"/>
-              <a:t>11/6/24</a:t>
+              <a:t>11/13/24</a:t>
             </a:fld>
             <a:endParaRPr lang="en-US"/>
           </a:p>
@@ -1035,7 +1035,7 @@
           <a:p>
             <a:fld id="{A2BAE022-C88F-2B41-9F90-7F832352A141}" type="datetimeFigureOut">
               <a:rPr lang="en-US" smtClean="0"/>
-              <a:t>11/6/24</a:t>
+              <a:t>11/13/24</a:t>
             </a:fld>
             <a:endParaRPr lang="en-US"/>
           </a:p>
@@ -1205,7 +1205,7 @@
           <a:p>
             <a:fld id="{A2BAE022-C88F-2B41-9F90-7F832352A141}" type="datetimeFigureOut">
               <a:rPr lang="en-US" smtClean="0"/>
-              <a:t>11/6/24</a:t>
+              <a:t>11/13/24</a:t>
             </a:fld>
             <a:endParaRPr lang="en-US"/>
           </a:p>
@@ -1449,7 +1449,7 @@
           <a:p>
             <a:fld id="{A2BAE022-C88F-2B41-9F90-7F832352A141}" type="datetimeFigureOut">
               <a:rPr lang="en-US" smtClean="0"/>
-              <a:t>11/6/24</a:t>
+              <a:t>11/13/24</a:t>
             </a:fld>
             <a:endParaRPr lang="en-US"/>
           </a:p>
@@ -1681,7 +1681,7 @@
           <a:p>
             <a:fld id="{A2BAE022-C88F-2B41-9F90-7F832352A141}" type="datetimeFigureOut">
               <a:rPr lang="en-US" smtClean="0"/>
-              <a:t>11/6/24</a:t>
+              <a:t>11/13/24</a:t>
             </a:fld>
             <a:endParaRPr lang="en-US"/>
           </a:p>
@@ -2048,7 +2048,7 @@
           <a:p>
             <a:fld id="{A2BAE022-C88F-2B41-9F90-7F832352A141}" type="datetimeFigureOut">
               <a:rPr lang="en-US" smtClean="0"/>
-              <a:t>11/6/24</a:t>
+              <a:t>11/13/24</a:t>
             </a:fld>
             <a:endParaRPr lang="en-US"/>
           </a:p>
@@ -2166,7 +2166,7 @@
           <a:p>
             <a:fld id="{A2BAE022-C88F-2B41-9F90-7F832352A141}" type="datetimeFigureOut">
               <a:rPr lang="en-US" smtClean="0"/>
-              <a:t>11/6/24</a:t>
+              <a:t>11/13/24</a:t>
             </a:fld>
             <a:endParaRPr lang="en-US"/>
           </a:p>
@@ -2261,7 +2261,7 @@
           <a:p>
             <a:fld id="{A2BAE022-C88F-2B41-9F90-7F832352A141}" type="datetimeFigureOut">
               <a:rPr lang="en-US" smtClean="0"/>
-              <a:t>11/6/24</a:t>
+              <a:t>11/13/24</a:t>
             </a:fld>
             <a:endParaRPr lang="en-US"/>
           </a:p>
@@ -2538,7 +2538,7 @@
           <a:p>
             <a:fld id="{A2BAE022-C88F-2B41-9F90-7F832352A141}" type="datetimeFigureOut">
               <a:rPr lang="en-US" smtClean="0"/>
-              <a:t>11/6/24</a:t>
+              <a:t>11/13/24</a:t>
             </a:fld>
             <a:endParaRPr lang="en-US"/>
           </a:p>
@@ -2795,7 +2795,7 @@
           <a:p>
             <a:fld id="{A2BAE022-C88F-2B41-9F90-7F832352A141}" type="datetimeFigureOut">
               <a:rPr lang="en-US" smtClean="0"/>
-              <a:t>11/6/24</a:t>
+              <a:t>11/13/24</a:t>
             </a:fld>
             <a:endParaRPr lang="en-US"/>
           </a:p>
@@ -3008,7 +3008,7 @@
           <a:p>
             <a:fld id="{A2BAE022-C88F-2B41-9F90-7F832352A141}" type="datetimeFigureOut">
               <a:rPr lang="en-US" smtClean="0"/>
-              <a:t>11/6/24</a:t>
+              <a:t>11/13/24</a:t>
             </a:fld>
             <a:endParaRPr lang="en-US"/>
           </a:p>
@@ -3508,9 +3508,9 @@
                 <p:grpSpPr>
                   <a:xfrm>
                     <a:off x="388970" y="2546333"/>
-                    <a:ext cx="10690858" cy="8198282"/>
+                    <a:ext cx="10690858" cy="8216972"/>
                     <a:chOff x="380606" y="2686363"/>
-                    <a:chExt cx="10690858" cy="8198282"/>
+                    <a:chExt cx="10690858" cy="8216972"/>
                   </a:xfrm>
                 </p:grpSpPr>
                 <p:grpSp>
@@ -3527,10 +3527,10 @@
                   </p:nvGrpSpPr>
                   <p:grpSpPr>
                     <a:xfrm>
-                      <a:off x="380606" y="2891309"/>
-                      <a:ext cx="10690858" cy="7993336"/>
-                      <a:chOff x="588344" y="2891310"/>
-                      <a:chExt cx="10690858" cy="7993336"/>
+                      <a:off x="380606" y="2912061"/>
+                      <a:ext cx="10690858" cy="7991274"/>
+                      <a:chOff x="588344" y="2912062"/>
+                      <a:chExt cx="10690858" cy="7991274"/>
                     </a:xfrm>
                   </p:grpSpPr>
                   <p:grpSp>
@@ -3547,10 +3547,10 @@
                     </p:nvGrpSpPr>
                     <p:grpSpPr>
                       <a:xfrm>
-                        <a:off x="1215945" y="5947090"/>
-                        <a:ext cx="10063257" cy="4937556"/>
-                        <a:chOff x="1049961" y="1400393"/>
-                        <a:chExt cx="10063257" cy="4937556"/>
+                        <a:off x="1580855" y="5947090"/>
+                        <a:ext cx="9698347" cy="4956246"/>
+                        <a:chOff x="1414871" y="1400393"/>
+                        <a:chExt cx="9698347" cy="4956246"/>
                       </a:xfrm>
                     </p:grpSpPr>
                     <p:sp>
@@ -3606,10 +3606,10 @@
                       </p:nvGrpSpPr>
                       <p:grpSpPr>
                         <a:xfrm>
-                          <a:off x="1049961" y="2038766"/>
-                          <a:ext cx="10063257" cy="4299183"/>
-                          <a:chOff x="1049961" y="2038766"/>
-                          <a:chExt cx="10063257" cy="4299183"/>
+                          <a:off x="1414871" y="2038766"/>
+                          <a:ext cx="9698347" cy="4317873"/>
+                          <a:chOff x="1414871" y="2038766"/>
+                          <a:chExt cx="9698347" cy="4317873"/>
                         </a:xfrm>
                       </p:grpSpPr>
                       <p:grpSp>
@@ -4171,8 +4171,8 @@
                         </p:nvSpPr>
                         <p:spPr>
                           <a:xfrm>
-                            <a:off x="1049961" y="5783951"/>
-                            <a:ext cx="1213794" cy="553998"/>
+                            <a:off x="1414871" y="5802641"/>
+                            <a:ext cx="527709" cy="553998"/>
                           </a:xfrm>
                           <a:prstGeom prst="rect">
                             <a:avLst/>
@@ -4190,7 +4190,7 @@
                                 <a:latin typeface="Helvetica" pitchFamily="2" charset="0"/>
                                 <a:cs typeface="Times New Roman" panose="02020603050405020304" pitchFamily="18" charset="0"/>
                               </a:rPr>
-                              <a:t>b. TLI</a:t>
+                              <a:t>b.</a:t>
                             </a:r>
                           </a:p>
                         </p:txBody>
@@ -4211,10 +4211,10 @@
                     </p:nvGrpSpPr>
                     <p:grpSpPr>
                       <a:xfrm>
-                        <a:off x="588344" y="2891310"/>
-                        <a:ext cx="10690858" cy="7102054"/>
-                        <a:chOff x="588344" y="2891310"/>
-                        <a:chExt cx="10690858" cy="7102054"/>
+                        <a:off x="588344" y="2912062"/>
+                        <a:ext cx="10690858" cy="7081302"/>
+                        <a:chOff x="588344" y="2912062"/>
+                        <a:chExt cx="10690858" cy="7081302"/>
                       </a:xfrm>
                     </p:grpSpPr>
                     <p:grpSp>
@@ -4231,10 +4231,10 @@
                       </p:nvGrpSpPr>
                       <p:grpSpPr>
                         <a:xfrm>
-                          <a:off x="625478" y="2891310"/>
-                          <a:ext cx="10653724" cy="2750944"/>
-                          <a:chOff x="459494" y="607514"/>
-                          <a:chExt cx="10653724" cy="2750944"/>
+                          <a:off x="625478" y="2912062"/>
+                          <a:ext cx="10653724" cy="2730192"/>
+                          <a:chOff x="459494" y="628266"/>
+                          <a:chExt cx="10653724" cy="2730192"/>
                         </a:xfrm>
                       </p:grpSpPr>
                       <p:grpSp>
@@ -4396,10 +4396,10 @@
                         </p:nvGrpSpPr>
                         <p:grpSpPr>
                           <a:xfrm>
-                            <a:off x="1065164" y="607514"/>
-                            <a:ext cx="10048054" cy="2750944"/>
-                            <a:chOff x="1065164" y="607514"/>
-                            <a:chExt cx="10048054" cy="2750944"/>
+                            <a:off x="1493165" y="628266"/>
+                            <a:ext cx="9620053" cy="2730192"/>
+                            <a:chOff x="1493165" y="628266"/>
+                            <a:chExt cx="9620053" cy="2730192"/>
                           </a:xfrm>
                         </p:grpSpPr>
                         <p:grpSp>
@@ -5020,8 +5020,8 @@
                           </p:nvSpPr>
                           <p:spPr>
                             <a:xfrm>
-                              <a:off x="1065164" y="607514"/>
-                              <a:ext cx="1297150" cy="553998"/>
+                              <a:off x="1493165" y="628266"/>
+                              <a:ext cx="505267" cy="553998"/>
                             </a:xfrm>
                             <a:prstGeom prst="rect">
                               <a:avLst/>
@@ -5039,7 +5039,7 @@
                                   <a:latin typeface="Helvetica" pitchFamily="2" charset="0"/>
                                   <a:cs typeface="Times New Roman" panose="02020603050405020304" pitchFamily="18" charset="0"/>
                                 </a:rPr>
-                                <a:t>a. GBI</a:t>
+                                <a:t>a.</a:t>
                               </a:r>
                             </a:p>
                           </p:txBody>

</xml_diff>